<commit_message>
Update Lab Notes talk for ATPESC 2024
</commit_message>
<xml_diff>
--- a/lab-notebooks-a.pptx
+++ b/lab-notebooks-a.pptx
@@ -288,7 +288,7 @@
           <a:p>
             <a:fld id="{0B842F42-2CE9-4E35-95C1-410DC08A50B1}" type="datetimeFigureOut">
               <a:rPr lang="en-US" smtClean="0"/>
-              <a:t>8/3/2023</a:t>
+              <a:t>7/26/24</a:t>
             </a:fld>
             <a:endParaRPr lang="en-US"/>
           </a:p>
@@ -453,7 +453,7 @@
           <a:p>
             <a:fld id="{6F282904-F315-4730-8D91-37D99E141A6F}" type="datetimeFigureOut">
               <a:rPr lang="en-US" smtClean="0"/>
-              <a:t>8/3/2023</a:t>
+              <a:t>7/26/24</a:t>
             </a:fld>
             <a:endParaRPr lang="en-US"/>
           </a:p>
@@ -8507,7 +8507,7 @@
             <a:pPr lvl="1"/>
             <a:r>
               <a:rPr lang="en-US" dirty="0"/>
-              <a:t>The researchers' sense that something is missing</a:t>
+              <a:t>The researchers sense that something is missing</a:t>
             </a:r>
           </a:p>
           <a:p>
@@ -9839,7 +9839,7 @@
                 <a:effectLst/>
                 <a:latin typeface="+mn-lt"/>
               </a:rPr>
-              <a:t>Anshu Dubey, David E. Bernholdt, Greg Becker, and Jared O’Neal, Software Productivity and Sustainability track, in Argonne Training Program on Extreme-Scale Computing, St. Charles, Illinois, 2023. DOI: </a:t>
+              <a:t>Anshu Dubey, David E. Bernholdt, Greg Becker, and Jared O’Neal, Software Productivity and Sustainability track, in Argonne Training Program on Extreme-Scale Computing, St. Charles, Illinois, 2024. DOI: </a:t>
             </a:r>
             <a:r>
               <a:rPr lang="en-US" sz="1600" b="0" i="0" u="none" strike="noStrike" dirty="0">
@@ -11436,7 +11436,12 @@
             <p:ph idx="1"/>
           </p:nvPr>
         </p:nvSpPr>
-        <p:spPr/>
+        <p:spPr>
+          <a:xfrm>
+            <a:off x="365760" y="1435801"/>
+            <a:ext cx="11369809" cy="4047778"/>
+          </a:xfrm>
+        </p:spPr>
         <p:txBody>
           <a:bodyPr/>
           <a:lstStyle/>
@@ -11530,7 +11535,7 @@
         </p:nvSpPr>
         <p:spPr>
           <a:xfrm>
-            <a:off x="365760" y="1019393"/>
+            <a:off x="365760" y="863747"/>
             <a:ext cx="11160125" cy="500063"/>
           </a:xfrm>
         </p:spPr>
@@ -11549,6 +11554,78 @@
               </a:rPr>
               <a:t>The exception to the rule?</a:t>
             </a:r>
+          </a:p>
+        </p:txBody>
+      </p:sp>
+      <p:sp>
+        <p:nvSpPr>
+          <p:cNvPr id="5" name="TextBox 4">
+            <a:extLst>
+              <a:ext uri="{FF2B5EF4-FFF2-40B4-BE49-F238E27FC236}">
+                <a16:creationId xmlns:a16="http://schemas.microsoft.com/office/drawing/2014/main" id="{8E76CD66-A4F4-DC3E-70B0-F70B7F84DA74}"/>
+              </a:ext>
+            </a:extLst>
+          </p:cNvPr>
+          <p:cNvSpPr txBox="1"/>
+          <p:nvPr/>
+        </p:nvSpPr>
+        <p:spPr>
+          <a:xfrm>
+            <a:off x="3209688" y="5255589"/>
+            <a:ext cx="5472267" cy="738664"/>
+          </a:xfrm>
+          <a:prstGeom prst="rect">
+            <a:avLst/>
+          </a:prstGeom>
+          <a:noFill/>
+        </p:spPr>
+        <p:txBody>
+          <a:bodyPr wrap="none" lIns="118872" tIns="91440" rIns="118872" bIns="91440" rtlCol="0" anchor="ctr" anchorCtr="0">
+            <a:spAutoFit/>
+          </a:bodyPr>
+          <a:lstStyle/>
+          <a:p>
+            <a:pPr algn="ctr">
+              <a:lnSpc>
+                <a:spcPct val="90000"/>
+              </a:lnSpc>
+            </a:pPr>
+            <a:r>
+              <a:rPr lang="en-US" sz="2000" dirty="0">
+                <a:hlinkClick r:id="rId2"/>
+              </a:rPr>
+              <a:t>Jupyter4Science</a:t>
+            </a:r>
+            <a:r>
+              <a:rPr lang="en-US" sz="2000" dirty="0"/>
+              <a:t> Community Knowledge Base</a:t>
+            </a:r>
+          </a:p>
+          <a:p>
+            <a:pPr algn="ctr">
+              <a:lnSpc>
+                <a:spcPct val="90000"/>
+              </a:lnSpc>
+            </a:pPr>
+            <a:r>
+              <a:rPr lang="en-US" sz="2000" dirty="0"/>
+              <a:t>2023 </a:t>
+            </a:r>
+            <a:r>
+              <a:rPr lang="en-US" sz="2000" dirty="0" err="1"/>
+              <a:t>BSSw</a:t>
+            </a:r>
+            <a:r>
+              <a:rPr lang="en-US" sz="2000" dirty="0"/>
+              <a:t> Fellow </a:t>
+            </a:r>
+            <a:r>
+              <a:rPr lang="en-US" sz="2000" dirty="0">
+                <a:hlinkClick r:id="rId3"/>
+              </a:rPr>
+              <a:t>Nicole Brewer</a:t>
+            </a:r>
+            <a:endParaRPr lang="en-US" sz="2000" dirty="0"/>
           </a:p>
         </p:txBody>
       </p:sp>
@@ -12758,140 +12835,116 @@
           <a:p>
             <a:r>
               <a:rPr lang="en-US" sz="2000" dirty="0"/>
-              <a:t>Bell, Alexander Graham, </a:t>
+              <a:t>Carlo Graziani, </a:t>
             </a:r>
             <a:r>
               <a:rPr lang="en-US" sz="2000" i="1" dirty="0"/>
-              <a:t>et al</a:t>
+              <a:t>HPC and the Lab Manager</a:t>
             </a:r>
             <a:r>
               <a:rPr lang="en-US" sz="2000" dirty="0"/>
-              <a:t>. </a:t>
-            </a:r>
-            <a:r>
-              <a:rPr lang="en-US" sz="2000" i="1" dirty="0">
+              <a:t>.  </a:t>
+            </a:r>
+            <a:r>
+              <a:rPr lang="en-US" sz="2000" b="1" dirty="0"/>
+              <a:t>Better Scientific Software</a:t>
+            </a:r>
+            <a:r>
+              <a:rPr lang="en-US" sz="2000" dirty="0"/>
+              <a:t>. </a:t>
+            </a:r>
+            <a:r>
+              <a:rPr lang="en-US" sz="2000" dirty="0">
                 <a:hlinkClick r:id="rId2"/>
               </a:rPr>
-              <a:t>Notebook by Alexander Graham Bell, from 1875 to 1876</a:t>
+              <a:t>https://bssw.io/blog_posts/hpc-and-the-lab-manager</a:t>
             </a:r>
             <a:r>
               <a:rPr lang="en-US" sz="2000" dirty="0"/>
-              <a:t>. Manuscript/Mixed Material. Image 22 retrieved from the Library of Congress.</a:t>
+              <a:t>. Nov 17, 2021.</a:t>
             </a:r>
           </a:p>
           <a:p>
             <a:r>
               <a:rPr lang="en-US" sz="2000" dirty="0"/>
-              <a:t>Carlo Graziani, </a:t>
+              <a:t>Katherine Riley, </a:t>
             </a:r>
             <a:r>
               <a:rPr lang="en-US" sz="2000" i="1" dirty="0"/>
-              <a:t>HPC and the Lab Manager</a:t>
+              <a:t>What All Codes Should Do: Best Practices</a:t>
             </a:r>
             <a:r>
               <a:rPr lang="en-US" sz="2000" dirty="0"/>
-              <a:t>.  </a:t>
-            </a:r>
-            <a:r>
-              <a:rPr lang="en-US" sz="2000" b="1" dirty="0"/>
-              <a:t>Better Scientific Software</a:t>
-            </a:r>
-            <a:r>
-              <a:rPr lang="en-US" sz="2000" dirty="0"/>
-              <a:t>. </a:t>
+              <a:t>. ATPESC 2019 presentation.  Retrieved from </a:t>
             </a:r>
             <a:r>
               <a:rPr lang="en-US" sz="2000" dirty="0">
                 <a:hlinkClick r:id="rId3"/>
               </a:rPr>
-              <a:t>https://bssw.io/blog_posts/hpc-and-the-lab-manager</a:t>
+              <a:t>YouTube</a:t>
             </a:r>
             <a:r>
               <a:rPr lang="en-US" sz="2000" dirty="0"/>
-              <a:t>. Nov 17, 2021.</a:t>
+              <a:t>. Nov 5, 2019.</a:t>
             </a:r>
           </a:p>
           <a:p>
             <a:r>
               <a:rPr lang="en-US" sz="2000" dirty="0"/>
-              <a:t>Katherine Riley, </a:t>
-            </a:r>
-            <a:r>
-              <a:rPr lang="en-US" sz="2000" i="1" dirty="0"/>
-              <a:t>What All Codes Should Do: Best Practices</a:t>
+              <a:t>Howard M. </a:t>
+            </a:r>
+            <a:r>
+              <a:rPr lang="en-US" sz="2000" dirty="0" err="1"/>
+              <a:t>Kanare</a:t>
             </a:r>
             <a:r>
               <a:rPr lang="en-US" sz="2000" dirty="0"/>
-              <a:t>. ATPESC 2019 presentation.  Retrieved from </a:t>
-            </a:r>
-            <a:r>
-              <a:rPr lang="en-US" sz="2000" dirty="0">
+              <a:t>, </a:t>
+            </a:r>
+            <a:r>
+              <a:rPr lang="en-US" sz="2000" i="1" dirty="0">
                 <a:hlinkClick r:id="rId4"/>
               </a:rPr>
-              <a:t>YouTube</a:t>
+              <a:t>Writing the Laboratory Notebook</a:t>
+            </a:r>
+            <a:r>
+              <a:rPr lang="en-US" sz="2000" i="1" dirty="0"/>
+              <a:t>. </a:t>
             </a:r>
             <a:r>
               <a:rPr lang="en-US" sz="2000" dirty="0"/>
-              <a:t>. Nov 5, 2019.</a:t>
+              <a:t>American Chemical Society, Washington, D.C., 1985.</a:t>
             </a:r>
           </a:p>
           <a:p>
             <a:r>
               <a:rPr lang="en-US" sz="2000" dirty="0"/>
-              <a:t>Howard M. </a:t>
-            </a:r>
-            <a:r>
-              <a:rPr lang="en-US" sz="2000" dirty="0" err="1"/>
-              <a:t>Kanare</a:t>
-            </a:r>
-            <a:r>
-              <a:rPr lang="en-US" sz="2000" dirty="0"/>
-              <a:t>, </a:t>
+              <a:t>DIKW pyramid. 2022, August 4.  In </a:t>
+            </a:r>
+            <a:r>
+              <a:rPr lang="en-US" sz="2000" i="1" dirty="0"/>
+              <a:t>Wikipedia. </a:t>
             </a:r>
             <a:r>
               <a:rPr lang="en-US" sz="2000" i="1" dirty="0">
                 <a:hlinkClick r:id="rId5"/>
               </a:rPr>
-              <a:t>Writing the Laboratory Notebook</a:t>
+              <a:t>https://en.wikipedia.org/wiki/DIKW_pyramid</a:t>
             </a:r>
             <a:r>
               <a:rPr lang="en-US" sz="2000" i="1" dirty="0"/>
-              <a:t>. </a:t>
-            </a:r>
+              <a:t>.</a:t>
+            </a:r>
+            <a:endParaRPr lang="en-US" sz="2000" dirty="0"/>
+          </a:p>
+          <a:p>
             <a:r>
               <a:rPr lang="en-US" sz="2000" dirty="0"/>
-              <a:t>American Chemical Society, Washington, D.C., 1985.</a:t>
-            </a:r>
-          </a:p>
-          <a:p>
-            <a:r>
-              <a:rPr lang="en-US" sz="2000" dirty="0"/>
-              <a:t>DIKW pyramid. 2022, August 4.  In </a:t>
-            </a:r>
-            <a:r>
-              <a:rPr lang="en-US" sz="2000" i="1" dirty="0"/>
-              <a:t>Wikipedia. </a:t>
+              <a:t>Roberta Kwok, </a:t>
             </a:r>
             <a:r>
               <a:rPr lang="en-US" sz="2000" i="1" dirty="0">
                 <a:hlinkClick r:id="rId6"/>
-              </a:rPr>
-              <a:t>https://en.wikipedia.org/wiki/DIKW_pyramid</a:t>
-            </a:r>
-            <a:r>
-              <a:rPr lang="en-US" sz="2000" i="1" dirty="0"/>
-              <a:t>.</a:t>
-            </a:r>
-            <a:endParaRPr lang="en-US" sz="2000" dirty="0"/>
-          </a:p>
-          <a:p>
-            <a:r>
-              <a:rPr lang="en-US" sz="2000" dirty="0"/>
-              <a:t>Roberta Kwok, </a:t>
-            </a:r>
-            <a:r>
-              <a:rPr lang="en-US" sz="2000" i="1" dirty="0">
-                <a:hlinkClick r:id="rId7"/>
               </a:rPr>
               <a:t>How to pick an electronic laboratory notebook</a:t>
             </a:r>
@@ -12936,14 +12989,72 @@
             </a:r>
             <a:r>
               <a:rPr lang="en-US" sz="2000" dirty="0">
+                <a:hlinkClick r:id="rId7"/>
+              </a:rPr>
+              <a:t>https://bssw.io/items/executable-environments-for-software-data-and-publication</a:t>
+            </a:r>
+            <a:r>
+              <a:rPr lang="en-US" sz="2000" dirty="0"/>
+              <a:t>. Sept 3, 2021.</a:t>
+            </a:r>
+          </a:p>
+          <a:p>
+            <a:r>
+              <a:rPr lang="en-US" sz="2000" dirty="0"/>
+              <a:t>Nicole Brewer, </a:t>
+            </a:r>
+            <a:r>
+              <a:rPr lang="en-US" sz="2000" b="0" i="1" u="none" strike="noStrike" dirty="0">
+                <a:solidFill>
+                  <a:srgbClr val="3C3C3E"/>
+                </a:solidFill>
+                <a:effectLst/>
+              </a:rPr>
+              <a:t>Jupyter4Science: Better Practices for Using </a:t>
+            </a:r>
+            <a:r>
+              <a:rPr lang="en-US" sz="2000" b="0" i="1" u="none" strike="noStrike" dirty="0" err="1">
+                <a:solidFill>
+                  <a:srgbClr val="3C3C3E"/>
+                </a:solidFill>
+                <a:effectLst/>
+              </a:rPr>
+              <a:t>Jupyter</a:t>
+            </a:r>
+            <a:r>
+              <a:rPr lang="en-US" sz="2000" b="0" i="1" u="none" strike="noStrike" dirty="0">
+                <a:solidFill>
+                  <a:srgbClr val="3C3C3E"/>
+                </a:solidFill>
+                <a:effectLst/>
+              </a:rPr>
+              <a:t> Notebooks for Science</a:t>
+            </a:r>
+            <a:r>
+              <a:rPr lang="en-US" sz="2000" dirty="0"/>
+              <a:t>.  </a:t>
+            </a:r>
+            <a:r>
+              <a:rPr lang="en-US" sz="2000" b="1" dirty="0"/>
+              <a:t>Better Scientific Software</a:t>
+            </a:r>
+            <a:r>
+              <a:rPr lang="en-US" sz="2000" dirty="0"/>
+              <a:t>. </a:t>
+            </a:r>
+            <a:r>
+              <a:rPr lang="en-US" sz="2000" dirty="0">
                 <a:hlinkClick r:id="rId8"/>
               </a:rPr>
-              <a:t>https://bssw.io/items/executable-environments-for-software-data-and-publication</a:t>
+              <a:t>https://bssw.io/items/jupyter4science-better-practices-for-using-jupyter-notebooks-for-science</a:t>
             </a:r>
             <a:r>
               <a:rPr lang="en-US" sz="2000" dirty="0"/>
-              <a:t>. Sept 3, 2021.</a:t>
-            </a:r>
+              <a:t>. March 17, 2024.</a:t>
+            </a:r>
+            <a:endParaRPr lang="en-US" sz="2000" i="1" dirty="0"/>
+          </a:p>
+          <a:p>
             <a:endParaRPr lang="en-US" sz="2000" i="1" dirty="0"/>
           </a:p>
           <a:p>
@@ -15150,6 +15261,15 @@
 </file>
 
 <file path=customXml/item1.xml><?xml version="1.0" encoding="utf-8"?>
+<?mso-contentType ?>
+<FormTemplates xmlns="http://schemas.microsoft.com/sharepoint/v3/contenttype/forms">
+  <Display>DocumentLibraryForm</Display>
+  <Edit>DocumentLibraryForm</Edit>
+  <New>DocumentLibraryForm</New>
+</FormTemplates>
+</file>
+
+<file path=customXml/item2.xml><?xml version="1.0" encoding="utf-8"?>
 <ct:contentTypeSchema xmlns:ct="http://schemas.microsoft.com/office/2006/metadata/contentType" xmlns:ma="http://schemas.microsoft.com/office/2006/metadata/properties/metaAttributes" ct:_="" ma:_="" ma:contentTypeName="Document" ma:contentTypeID="0x010100565464437F680748A68B85EB6594EA7D" ma:contentTypeVersion="0" ma:contentTypeDescription="Create a new document." ma:contentTypeScope="" ma:versionID="fe3f4dd58d5914c51cfc6deaa8ad845c">
   <xsd:schema xmlns:xsd="http://www.w3.org/2001/XMLSchema" xmlns:p="http://schemas.microsoft.com/office/2006/metadata/properties" targetNamespace="http://schemas.microsoft.com/office/2006/metadata/properties" ma:root="true" ma:fieldsID="4aeb20c0e3442673af7ee10786458764">
     <xsd:element name="properties">
@@ -15198,15 +15318,6 @@
 </ct:contentTypeSchema>
 </file>
 
-<file path=customXml/item2.xml><?xml version="1.0" encoding="utf-8"?>
-<?mso-contentType ?>
-<FormTemplates xmlns="http://schemas.microsoft.com/sharepoint/v3/contenttype/forms">
-  <Display>DocumentLibraryForm</Display>
-  <Edit>DocumentLibraryForm</Edit>
-  <New>DocumentLibraryForm</New>
-</FormTemplates>
-</file>
-
 <file path=customXml/item3.xml><?xml version="1.0" encoding="utf-8"?>
 <p:properties xmlns:p="http://schemas.microsoft.com/office/2006/metadata/properties" xmlns:xsi="http://www.w3.org/2001/XMLSchema-instance" xmlns:pc="http://schemas.microsoft.com/office/infopath/2007/PartnerControls">
   <documentManagement/>
@@ -15214,6 +15325,14 @@
 </file>
 
 <file path=customXml/itemProps1.xml><?xml version="1.0" encoding="utf-8"?>
+<ds:datastoreItem xmlns:ds="http://schemas.openxmlformats.org/officeDocument/2006/customXml" ds:itemID="{19E20559-B232-4371-8690-E3D8007EDB82}">
+  <ds:schemaRefs>
+    <ds:schemaRef ds:uri="http://schemas.microsoft.com/sharepoint/v3/contenttype/forms"/>
+  </ds:schemaRefs>
+</ds:datastoreItem>
+</file>
+
+<file path=customXml/itemProps2.xml><?xml version="1.0" encoding="utf-8"?>
 <ds:datastoreItem xmlns:ds="http://schemas.openxmlformats.org/officeDocument/2006/customXml" ds:itemID="{E8DB7DEB-074E-4EE8-9B6E-FD277323109C}">
   <ds:schemaRefs>
     <ds:schemaRef ds:uri="http://schemas.microsoft.com/office/2006/metadata/contentType"/>
@@ -15224,14 +15343,6 @@
     <ds:schemaRef ds:uri="http://purl.org/dc/elements/1.1/"/>
     <ds:schemaRef ds:uri="http://purl.org/dc/terms/"/>
     <ds:schemaRef ds:uri="http://schemas.microsoft.com/office/internal/2005/internalDocumentation"/>
-  </ds:schemaRefs>
-</ds:datastoreItem>
-</file>
-
-<file path=customXml/itemProps2.xml><?xml version="1.0" encoding="utf-8"?>
-<ds:datastoreItem xmlns:ds="http://schemas.openxmlformats.org/officeDocument/2006/customXml" ds:itemID="{19E20559-B232-4371-8690-E3D8007EDB82}">
-  <ds:schemaRefs>
-    <ds:schemaRef ds:uri="http://schemas.microsoft.com/sharepoint/v3/contenttype/forms"/>
   </ds:schemaRefs>
 </ds:datastoreItem>
 </file>

</xml_diff>

<commit_message>
Exchanged citation order to match slide order
</commit_message>
<xml_diff>
--- a/lab-notebooks-a.pptx
+++ b/lab-notebooks-a.pptx
@@ -12964,6 +12964,62 @@
           <a:p>
             <a:r>
               <a:rPr lang="en-US" sz="2000" dirty="0"/>
+              <a:t>Nicole Brewer, </a:t>
+            </a:r>
+            <a:r>
+              <a:rPr lang="en-US" sz="2000" b="0" i="1" u="none" strike="noStrike" dirty="0">
+                <a:solidFill>
+                  <a:srgbClr val="3C3C3E"/>
+                </a:solidFill>
+                <a:effectLst/>
+              </a:rPr>
+              <a:t>Jupyter4Science: Better Practices for Using </a:t>
+            </a:r>
+            <a:r>
+              <a:rPr lang="en-US" sz="2000" b="0" i="1" u="none" strike="noStrike" dirty="0" err="1">
+                <a:solidFill>
+                  <a:srgbClr val="3C3C3E"/>
+                </a:solidFill>
+                <a:effectLst/>
+              </a:rPr>
+              <a:t>Jupyter</a:t>
+            </a:r>
+            <a:r>
+              <a:rPr lang="en-US" sz="2000" b="0" i="1" u="none" strike="noStrike" dirty="0">
+                <a:solidFill>
+                  <a:srgbClr val="3C3C3E"/>
+                </a:solidFill>
+                <a:effectLst/>
+              </a:rPr>
+              <a:t> Notebooks for Science</a:t>
+            </a:r>
+            <a:r>
+              <a:rPr lang="en-US" sz="2000" dirty="0"/>
+              <a:t>.  </a:t>
+            </a:r>
+            <a:r>
+              <a:rPr lang="en-US" sz="2000" b="1" dirty="0"/>
+              <a:t>Better Scientific Software</a:t>
+            </a:r>
+            <a:r>
+              <a:rPr lang="en-US" sz="2000" dirty="0"/>
+              <a:t>. </a:t>
+            </a:r>
+            <a:r>
+              <a:rPr lang="en-US" sz="2000" dirty="0">
+                <a:hlinkClick r:id="rId7"/>
+              </a:rPr>
+              <a:t>https://bssw.io/items/jupyter4science-better-practices-for-using-jupyter-notebooks-for-science</a:t>
+            </a:r>
+            <a:r>
+              <a:rPr lang="en-US" sz="2000" dirty="0"/>
+              <a:t>. March 17, 2024.</a:t>
+            </a:r>
+            <a:endParaRPr lang="en-US" sz="2000" i="1" dirty="0"/>
+          </a:p>
+          <a:p>
+            <a:r>
+              <a:rPr lang="en-US" sz="2000" dirty="0"/>
               <a:t>Jean Shuler, </a:t>
             </a:r>
             <a:r>
@@ -12989,7 +13045,7 @@
             </a:r>
             <a:r>
               <a:rPr lang="en-US" sz="2000" dirty="0">
-                <a:hlinkClick r:id="rId7"/>
+                <a:hlinkClick r:id="rId8"/>
               </a:rPr>
               <a:t>https://bssw.io/items/executable-environments-for-software-data-and-publication</a:t>
             </a:r>
@@ -12997,62 +13053,6 @@
               <a:rPr lang="en-US" sz="2000" dirty="0"/>
               <a:t>. Sept 3, 2021.</a:t>
             </a:r>
-          </a:p>
-          <a:p>
-            <a:r>
-              <a:rPr lang="en-US" sz="2000" dirty="0"/>
-              <a:t>Nicole Brewer, </a:t>
-            </a:r>
-            <a:r>
-              <a:rPr lang="en-US" sz="2000" b="0" i="1" u="none" strike="noStrike" dirty="0">
-                <a:solidFill>
-                  <a:srgbClr val="3C3C3E"/>
-                </a:solidFill>
-                <a:effectLst/>
-              </a:rPr>
-              <a:t>Jupyter4Science: Better Practices for Using </a:t>
-            </a:r>
-            <a:r>
-              <a:rPr lang="en-US" sz="2000" b="0" i="1" u="none" strike="noStrike" dirty="0" err="1">
-                <a:solidFill>
-                  <a:srgbClr val="3C3C3E"/>
-                </a:solidFill>
-                <a:effectLst/>
-              </a:rPr>
-              <a:t>Jupyter</a:t>
-            </a:r>
-            <a:r>
-              <a:rPr lang="en-US" sz="2000" b="0" i="1" u="none" strike="noStrike" dirty="0">
-                <a:solidFill>
-                  <a:srgbClr val="3C3C3E"/>
-                </a:solidFill>
-                <a:effectLst/>
-              </a:rPr>
-              <a:t> Notebooks for Science</a:t>
-            </a:r>
-            <a:r>
-              <a:rPr lang="en-US" sz="2000" dirty="0"/>
-              <a:t>.  </a:t>
-            </a:r>
-            <a:r>
-              <a:rPr lang="en-US" sz="2000" b="1" dirty="0"/>
-              <a:t>Better Scientific Software</a:t>
-            </a:r>
-            <a:r>
-              <a:rPr lang="en-US" sz="2000" dirty="0"/>
-              <a:t>. </a:t>
-            </a:r>
-            <a:r>
-              <a:rPr lang="en-US" sz="2000" dirty="0">
-                <a:hlinkClick r:id="rId8"/>
-              </a:rPr>
-              <a:t>https://bssw.io/items/jupyter4science-better-practices-for-using-jupyter-notebooks-for-science</a:t>
-            </a:r>
-            <a:r>
-              <a:rPr lang="en-US" sz="2000" dirty="0"/>
-              <a:t>. March 17, 2024.</a:t>
-            </a:r>
-            <a:endParaRPr lang="en-US" sz="2000" i="1" dirty="0"/>
           </a:p>
           <a:p>
             <a:endParaRPr lang="en-US" sz="2000" i="1" dirty="0"/>
@@ -15261,15 +15261,6 @@
 </file>
 
 <file path=customXml/item1.xml><?xml version="1.0" encoding="utf-8"?>
-<?mso-contentType ?>
-<FormTemplates xmlns="http://schemas.microsoft.com/sharepoint/v3/contenttype/forms">
-  <Display>DocumentLibraryForm</Display>
-  <Edit>DocumentLibraryForm</Edit>
-  <New>DocumentLibraryForm</New>
-</FormTemplates>
-</file>
-
-<file path=customXml/item2.xml><?xml version="1.0" encoding="utf-8"?>
 <ct:contentTypeSchema xmlns:ct="http://schemas.microsoft.com/office/2006/metadata/contentType" xmlns:ma="http://schemas.microsoft.com/office/2006/metadata/properties/metaAttributes" ct:_="" ma:_="" ma:contentTypeName="Document" ma:contentTypeID="0x010100565464437F680748A68B85EB6594EA7D" ma:contentTypeVersion="0" ma:contentTypeDescription="Create a new document." ma:contentTypeScope="" ma:versionID="fe3f4dd58d5914c51cfc6deaa8ad845c">
   <xsd:schema xmlns:xsd="http://www.w3.org/2001/XMLSchema" xmlns:p="http://schemas.microsoft.com/office/2006/metadata/properties" targetNamespace="http://schemas.microsoft.com/office/2006/metadata/properties" ma:root="true" ma:fieldsID="4aeb20c0e3442673af7ee10786458764">
     <xsd:element name="properties">
@@ -15318,6 +15309,15 @@
 </ct:contentTypeSchema>
 </file>
 
+<file path=customXml/item2.xml><?xml version="1.0" encoding="utf-8"?>
+<?mso-contentType ?>
+<FormTemplates xmlns="http://schemas.microsoft.com/sharepoint/v3/contenttype/forms">
+  <Display>DocumentLibraryForm</Display>
+  <Edit>DocumentLibraryForm</Edit>
+  <New>DocumentLibraryForm</New>
+</FormTemplates>
+</file>
+
 <file path=customXml/item3.xml><?xml version="1.0" encoding="utf-8"?>
 <p:properties xmlns:p="http://schemas.microsoft.com/office/2006/metadata/properties" xmlns:xsi="http://www.w3.org/2001/XMLSchema-instance" xmlns:pc="http://schemas.microsoft.com/office/infopath/2007/PartnerControls">
   <documentManagement/>
@@ -15325,14 +15325,6 @@
 </file>
 
 <file path=customXml/itemProps1.xml><?xml version="1.0" encoding="utf-8"?>
-<ds:datastoreItem xmlns:ds="http://schemas.openxmlformats.org/officeDocument/2006/customXml" ds:itemID="{19E20559-B232-4371-8690-E3D8007EDB82}">
-  <ds:schemaRefs>
-    <ds:schemaRef ds:uri="http://schemas.microsoft.com/sharepoint/v3/contenttype/forms"/>
-  </ds:schemaRefs>
-</ds:datastoreItem>
-</file>
-
-<file path=customXml/itemProps2.xml><?xml version="1.0" encoding="utf-8"?>
 <ds:datastoreItem xmlns:ds="http://schemas.openxmlformats.org/officeDocument/2006/customXml" ds:itemID="{E8DB7DEB-074E-4EE8-9B6E-FD277323109C}">
   <ds:schemaRefs>
     <ds:schemaRef ds:uri="http://schemas.microsoft.com/office/2006/metadata/contentType"/>
@@ -15343,6 +15335,14 @@
     <ds:schemaRef ds:uri="http://purl.org/dc/elements/1.1/"/>
     <ds:schemaRef ds:uri="http://purl.org/dc/terms/"/>
     <ds:schemaRef ds:uri="http://schemas.microsoft.com/office/internal/2005/internalDocumentation"/>
+  </ds:schemaRefs>
+</ds:datastoreItem>
+</file>
+
+<file path=customXml/itemProps2.xml><?xml version="1.0" encoding="utf-8"?>
+<ds:datastoreItem xmlns:ds="http://schemas.openxmlformats.org/officeDocument/2006/customXml" ds:itemID="{19E20559-B232-4371-8690-E3D8007EDB82}">
+  <ds:schemaRefs>
+    <ds:schemaRef ds:uri="http://schemas.microsoft.com/sharepoint/v3/contenttype/forms"/>
   </ds:schemaRefs>
 </ds:datastoreItem>
 </file>

</xml_diff>

<commit_message>
Update template and license slide for lab-notebooks-a for ATPESC
</commit_message>
<xml_diff>
--- a/lab-notebooks-a.pptx
+++ b/lab-notebooks-a.pptx
@@ -12,7 +12,7 @@
   </p:handoutMasterIdLst>
   <p:sldIdLst>
     <p:sldId id="256" r:id="rId5"/>
-    <p:sldId id="357" r:id="rId6"/>
+    <p:sldId id="320" r:id="rId6"/>
     <p:sldId id="350" r:id="rId7"/>
     <p:sldId id="322" r:id="rId8"/>
     <p:sldId id="349" r:id="rId9"/>
@@ -288,7 +288,7 @@
           <a:p>
             <a:fld id="{0B842F42-2CE9-4E35-95C1-410DC08A50B1}" type="datetimeFigureOut">
               <a:rPr lang="en-US" smtClean="0"/>
-              <a:t>7/26/24</a:t>
+              <a:t>7/26/2024</a:t>
             </a:fld>
             <a:endParaRPr lang="en-US"/>
           </a:p>
@@ -453,7 +453,7 @@
           <a:p>
             <a:fld id="{6F282904-F315-4730-8D91-37D99E141A6F}" type="datetimeFigureOut">
               <a:rPr lang="en-US" smtClean="0"/>
-              <a:t>7/26/24</a:t>
+              <a:t>7/26/2024</a:t>
             </a:fld>
             <a:endParaRPr lang="en-US"/>
           </a:p>
@@ -2813,17 +2813,14 @@
                 <a:spcPct val="90000"/>
               </a:lnSpc>
             </a:pPr>
-            <a:r>
-              <a:rPr lang="en-US" sz="1600" dirty="0">
-                <a:ln>
-                  <a:noFill/>
-                </a:ln>
-                <a:solidFill>
-                  <a:schemeClr val="bg1"/>
-                </a:solidFill>
-              </a:rPr>
-              <a:t>exascaleproject.org</a:t>
-            </a:r>
+            <a:endParaRPr lang="en-US" sz="1600" dirty="0">
+              <a:ln>
+                <a:noFill/>
+              </a:ln>
+              <a:solidFill>
+                <a:schemeClr val="bg1"/>
+              </a:solidFill>
+            </a:endParaRPr>
           </a:p>
         </p:txBody>
       </p:sp>
@@ -2930,149 +2927,6 @@
       </p:sp>
       <p:pic>
         <p:nvPicPr>
-          <p:cNvPr id="12" name="Picture 11"/>
-          <p:cNvPicPr>
-            <a:picLocks noChangeAspect="1"/>
-          </p:cNvPicPr>
-          <p:nvPr userDrawn="1"/>
-        </p:nvPicPr>
-        <p:blipFill>
-          <a:blip r:embed="rId2" cstate="print">
-            <a:extLst>
-              <a:ext uri="{28A0092B-C50C-407E-A947-70E740481C1C}">
-                <a14:useLocalDpi xmlns:a14="http://schemas.microsoft.com/office/drawing/2010/main" val="0"/>
-              </a:ext>
-            </a:extLst>
-          </a:blip>
-          <a:stretch>
-            <a:fillRect/>
-          </a:stretch>
-        </p:blipFill>
-        <p:spPr>
-          <a:xfrm>
-            <a:off x="362749" y="483164"/>
-            <a:ext cx="2050840" cy="935496"/>
-          </a:xfrm>
-          <a:prstGeom prst="rect">
-            <a:avLst/>
-          </a:prstGeom>
-        </p:spPr>
-      </p:pic>
-      <p:pic>
-        <p:nvPicPr>
-          <p:cNvPr id="16" name="Picture 15"/>
-          <p:cNvPicPr>
-            <a:picLocks noChangeAspect="1"/>
-          </p:cNvPicPr>
-          <p:nvPr userDrawn="1"/>
-        </p:nvPicPr>
-        <p:blipFill>
-          <a:blip r:embed="rId3" cstate="print">
-            <a:extLst>
-              <a:ext uri="{BEBA8EAE-BF5A-486C-A8C5-ECC9F3942E4B}">
-                <a14:imgProps xmlns:a14="http://schemas.microsoft.com/office/drawing/2010/main">
-                  <a14:imgLayer r:embed="rId4">
-                    <a14:imgEffect>
-                      <a14:brightnessContrast bright="100000"/>
-                    </a14:imgEffect>
-                  </a14:imgLayer>
-                </a14:imgProps>
-              </a:ext>
-              <a:ext uri="{28A0092B-C50C-407E-A947-70E740481C1C}">
-                <a14:useLocalDpi xmlns:a14="http://schemas.microsoft.com/office/drawing/2010/main" val="0"/>
-              </a:ext>
-            </a:extLst>
-          </a:blip>
-          <a:stretch>
-            <a:fillRect/>
-          </a:stretch>
-        </p:blipFill>
-        <p:spPr>
-          <a:xfrm>
-            <a:off x="7289921" y="6322747"/>
-            <a:ext cx="2409477" cy="401008"/>
-          </a:xfrm>
-          <a:prstGeom prst="rect">
-            <a:avLst/>
-          </a:prstGeom>
-        </p:spPr>
-      </p:pic>
-      <p:pic>
-        <p:nvPicPr>
-          <p:cNvPr id="17" name="Picture 16"/>
-          <p:cNvPicPr>
-            <a:picLocks noChangeAspect="1"/>
-          </p:cNvPicPr>
-          <p:nvPr userDrawn="1"/>
-        </p:nvPicPr>
-        <p:blipFill rotWithShape="1">
-          <a:blip r:embed="rId5" cstate="print">
-            <a:extLst>
-              <a:ext uri="{BEBA8EAE-BF5A-486C-A8C5-ECC9F3942E4B}">
-                <a14:imgProps xmlns:a14="http://schemas.microsoft.com/office/drawing/2010/main">
-                  <a14:imgLayer r:embed="rId6">
-                    <a14:imgEffect>
-                      <a14:brightnessContrast bright="100000"/>
-                    </a14:imgEffect>
-                  </a14:imgLayer>
-                </a14:imgProps>
-              </a:ext>
-              <a:ext uri="{28A0092B-C50C-407E-A947-70E740481C1C}">
-                <a14:useLocalDpi xmlns:a14="http://schemas.microsoft.com/office/drawing/2010/main" val="0"/>
-              </a:ext>
-            </a:extLst>
-          </a:blip>
-          <a:srcRect b="70693"/>
-          <a:stretch/>
-        </p:blipFill>
-        <p:spPr>
-          <a:xfrm>
-            <a:off x="10204521" y="6307740"/>
-            <a:ext cx="1367541" cy="428915"/>
-          </a:xfrm>
-          <a:prstGeom prst="rect">
-            <a:avLst/>
-          </a:prstGeom>
-        </p:spPr>
-      </p:pic>
-      <p:pic>
-        <p:nvPicPr>
-          <p:cNvPr id="8" name="Picture 7" descr="A picture containing shape&#10;&#10;Description automatically generated">
-            <a:extLst>
-              <a:ext uri="{FF2B5EF4-FFF2-40B4-BE49-F238E27FC236}">
-                <a16:creationId xmlns:a16="http://schemas.microsoft.com/office/drawing/2014/main" id="{C432A180-7341-4E28-8C2B-73F9AB53D13F}"/>
-              </a:ext>
-            </a:extLst>
-          </p:cNvPr>
-          <p:cNvPicPr>
-            <a:picLocks noChangeAspect="1"/>
-          </p:cNvPicPr>
-          <p:nvPr userDrawn="1"/>
-        </p:nvPicPr>
-        <p:blipFill>
-          <a:blip r:embed="rId7">
-            <a:extLst>
-              <a:ext uri="{28A0092B-C50C-407E-A947-70E740481C1C}">
-                <a14:useLocalDpi xmlns:a14="http://schemas.microsoft.com/office/drawing/2010/main" val="0"/>
-              </a:ext>
-            </a:extLst>
-          </a:blip>
-          <a:stretch>
-            <a:fillRect/>
-          </a:stretch>
-        </p:blipFill>
-        <p:spPr>
-          <a:xfrm>
-            <a:off x="333920" y="1848659"/>
-            <a:ext cx="2108499" cy="914400"/>
-          </a:xfrm>
-          <a:prstGeom prst="rect">
-            <a:avLst/>
-          </a:prstGeom>
-        </p:spPr>
-      </p:pic>
-      <p:pic>
-        <p:nvPicPr>
           <p:cNvPr id="13" name="Picture 2" descr="https://licensebuttons.net/l/by/4.0/88x31.png">
             <a:extLst>
               <a:ext uri="{FF2B5EF4-FFF2-40B4-BE49-F238E27FC236}">
@@ -3086,7 +2940,7 @@
           <p:nvPr userDrawn="1"/>
         </p:nvPicPr>
         <p:blipFill>
-          <a:blip r:embed="rId8">
+          <a:blip r:embed="rId2">
             <a:extLst>
               <a:ext uri="{28A0092B-C50C-407E-A947-70E740481C1C}">
                 <a14:useLocalDpi xmlns:a14="http://schemas.microsoft.com/office/drawing/2010/main" val="0"/>
@@ -3158,12 +3012,260 @@
           </a:p>
         </p:txBody>
       </p:sp>
+      <p:sp>
+        <p:nvSpPr>
+          <p:cNvPr id="6" name="Text Placeholder 5">
+            <a:extLst>
+              <a:ext uri="{FF2B5EF4-FFF2-40B4-BE49-F238E27FC236}">
+                <a16:creationId xmlns:a16="http://schemas.microsoft.com/office/drawing/2014/main" id="{516372F2-F09E-4139-B638-4F1B290B77B9}"/>
+              </a:ext>
+            </a:extLst>
+          </p:cNvPr>
+          <p:cNvSpPr>
+            <a:spLocks noGrp="1"/>
+          </p:cNvSpPr>
+          <p:nvPr>
+            <p:ph type="body" sz="quarter" idx="10" hasCustomPrompt="1"/>
+          </p:nvPr>
+        </p:nvSpPr>
+        <p:spPr>
+          <a:xfrm>
+            <a:off x="9335896" y="5913283"/>
+            <a:ext cx="2852929" cy="262814"/>
+          </a:xfrm>
+        </p:spPr>
+        <p:txBody>
+          <a:bodyPr/>
+          <a:lstStyle>
+            <a:lvl1pPr marL="0" indent="0" algn="r">
+              <a:buNone/>
+              <a:defRPr sz="1200"/>
+            </a:lvl1pPr>
+          </a:lstStyle>
+          <a:p>
+            <a:pPr lvl="0"/>
+            <a:r>
+              <a:rPr lang="en-US" dirty="0"/>
+              <a:t>R&amp;R number (if required)</a:t>
+            </a:r>
+          </a:p>
+        </p:txBody>
+      </p:sp>
+      <p:sp>
+        <p:nvSpPr>
+          <p:cNvPr id="9" name="Text Placeholder 8">
+            <a:extLst>
+              <a:ext uri="{FF2B5EF4-FFF2-40B4-BE49-F238E27FC236}">
+                <a16:creationId xmlns:a16="http://schemas.microsoft.com/office/drawing/2014/main" id="{7A08ED72-5D36-44C1-A3D6-C72E158E1FA6}"/>
+              </a:ext>
+            </a:extLst>
+          </p:cNvPr>
+          <p:cNvSpPr>
+            <a:spLocks noGrp="1"/>
+          </p:cNvSpPr>
+          <p:nvPr>
+            <p:ph type="body" sz="quarter" idx="11" hasCustomPrompt="1"/>
+          </p:nvPr>
+        </p:nvSpPr>
+        <p:spPr>
+          <a:xfrm>
+            <a:off x="3176924" y="2085870"/>
+            <a:ext cx="2427268" cy="424732"/>
+          </a:xfrm>
+        </p:spPr>
+        <p:txBody>
+          <a:bodyPr wrap="none">
+            <a:spAutoFit/>
+          </a:bodyPr>
+          <a:lstStyle>
+            <a:lvl1pPr marL="0" indent="0">
+              <a:buNone/>
+              <a:defRPr u="sng"/>
+            </a:lvl1pPr>
+          </a:lstStyle>
+          <a:p>
+            <a:pPr lvl="0"/>
+            <a:r>
+              <a:rPr lang="en-US" dirty="0"/>
+              <a:t>Presenter Name</a:t>
+            </a:r>
+          </a:p>
+        </p:txBody>
+      </p:sp>
+      <p:sp>
+        <p:nvSpPr>
+          <p:cNvPr id="11" name="Text Placeholder 10">
+            <a:extLst>
+              <a:ext uri="{FF2B5EF4-FFF2-40B4-BE49-F238E27FC236}">
+                <a16:creationId xmlns:a16="http://schemas.microsoft.com/office/drawing/2014/main" id="{07C2C5E0-3F9A-4B6C-82C6-FEE7176DA8DC}"/>
+              </a:ext>
+            </a:extLst>
+          </p:cNvPr>
+          <p:cNvSpPr>
+            <a:spLocks noGrp="1"/>
+          </p:cNvSpPr>
+          <p:nvPr>
+            <p:ph type="body" sz="quarter" idx="12" hasCustomPrompt="1"/>
+          </p:nvPr>
+        </p:nvSpPr>
+        <p:spPr>
+          <a:xfrm>
+            <a:off x="5667411" y="2134517"/>
+            <a:ext cx="1690167" cy="376085"/>
+          </a:xfrm>
+        </p:spPr>
+        <p:txBody>
+          <a:bodyPr>
+            <a:spAutoFit/>
+          </a:bodyPr>
+          <a:lstStyle>
+            <a:lvl1pPr marL="0" indent="0">
+              <a:buNone/>
+              <a:defRPr sz="2000"/>
+            </a:lvl1pPr>
+          </a:lstStyle>
+          <a:p>
+            <a:pPr lvl="0"/>
+            <a:r>
+              <a:rPr lang="en-US" dirty="0"/>
+              <a:t>(pronouns)</a:t>
+            </a:r>
+          </a:p>
+        </p:txBody>
+      </p:sp>
+      <p:sp>
+        <p:nvSpPr>
+          <p:cNvPr id="20" name="Text Placeholder 10">
+            <a:extLst>
+              <a:ext uri="{FF2B5EF4-FFF2-40B4-BE49-F238E27FC236}">
+                <a16:creationId xmlns:a16="http://schemas.microsoft.com/office/drawing/2014/main" id="{6EE16D41-009C-4DB1-A6DF-FEBADC8C343B}"/>
+              </a:ext>
+            </a:extLst>
+          </p:cNvPr>
+          <p:cNvSpPr>
+            <a:spLocks noGrp="1"/>
+          </p:cNvSpPr>
+          <p:nvPr>
+            <p:ph type="body" sz="quarter" idx="13" hasCustomPrompt="1"/>
+          </p:nvPr>
+        </p:nvSpPr>
+        <p:spPr>
+          <a:xfrm>
+            <a:off x="3176924" y="2459716"/>
+            <a:ext cx="8292315" cy="369332"/>
+          </a:xfrm>
+        </p:spPr>
+        <p:txBody>
+          <a:bodyPr wrap="square">
+            <a:spAutoFit/>
+          </a:bodyPr>
+          <a:lstStyle>
+            <a:lvl1pPr marL="0" indent="0">
+              <a:buNone/>
+              <a:defRPr sz="2000"/>
+            </a:lvl1pPr>
+          </a:lstStyle>
+          <a:p>
+            <a:pPr lvl="0"/>
+            <a:r>
+              <a:rPr lang="en-US" dirty="0"/>
+              <a:t>Long affiliation</a:t>
+            </a:r>
+          </a:p>
+        </p:txBody>
+      </p:sp>
+      <p:sp>
+        <p:nvSpPr>
+          <p:cNvPr id="21" name="Text Placeholder 10">
+            <a:extLst>
+              <a:ext uri="{FF2B5EF4-FFF2-40B4-BE49-F238E27FC236}">
+                <a16:creationId xmlns:a16="http://schemas.microsoft.com/office/drawing/2014/main" id="{8E791C6E-DB06-44D1-AB4E-AA0EF8215FBB}"/>
+              </a:ext>
+            </a:extLst>
+          </p:cNvPr>
+          <p:cNvSpPr>
+            <a:spLocks noGrp="1"/>
+          </p:cNvSpPr>
+          <p:nvPr>
+            <p:ph type="body" sz="quarter" idx="14" hasCustomPrompt="1"/>
+          </p:nvPr>
+        </p:nvSpPr>
+        <p:spPr>
+          <a:xfrm>
+            <a:off x="3176925" y="3161813"/>
+            <a:ext cx="8292316" cy="369332"/>
+          </a:xfrm>
+        </p:spPr>
+        <p:txBody>
+          <a:bodyPr wrap="square">
+            <a:spAutoFit/>
+          </a:bodyPr>
+          <a:lstStyle>
+            <a:lvl1pPr marL="0" indent="0">
+              <a:buNone/>
+              <a:defRPr sz="2000"/>
+            </a:lvl1pPr>
+          </a:lstStyle>
+          <a:p>
+            <a:pPr lvl="0"/>
+            <a:r>
+              <a:rPr lang="en-US" dirty="0"/>
+              <a:t>Tutorial title @ Venue</a:t>
+            </a:r>
+          </a:p>
+        </p:txBody>
+      </p:sp>
+      <p:sp>
+        <p:nvSpPr>
+          <p:cNvPr id="23" name="Text Placeholder 10">
+            <a:extLst>
+              <a:ext uri="{FF2B5EF4-FFF2-40B4-BE49-F238E27FC236}">
+                <a16:creationId xmlns:a16="http://schemas.microsoft.com/office/drawing/2014/main" id="{AA4CD3CE-55B5-4132-9AC3-B94506768C36}"/>
+              </a:ext>
+            </a:extLst>
+          </p:cNvPr>
+          <p:cNvSpPr>
+            <a:spLocks noGrp="1"/>
+          </p:cNvSpPr>
+          <p:nvPr>
+            <p:ph type="body" sz="quarter" idx="15" hasCustomPrompt="1"/>
+          </p:nvPr>
+        </p:nvSpPr>
+        <p:spPr>
+          <a:xfrm>
+            <a:off x="3176924" y="3792588"/>
+            <a:ext cx="8292316" cy="646331"/>
+          </a:xfrm>
+        </p:spPr>
+        <p:txBody>
+          <a:bodyPr wrap="square">
+            <a:spAutoFit/>
+          </a:bodyPr>
+          <a:lstStyle>
+            <a:lvl1pPr marL="0" indent="0">
+              <a:buNone/>
+              <a:defRPr sz="2000"/>
+            </a:lvl1pPr>
+          </a:lstStyle>
+          <a:p>
+            <a:pPr>
+              <a:spcBef>
+                <a:spcPts val="2800"/>
+              </a:spcBef>
+            </a:pPr>
+            <a:r>
+              <a:rPr lang="en-US" sz="2000" dirty="0"/>
+              <a:t>Contributors: Contributor Name (short affiliation), … in alphabetical order</a:t>
+            </a:r>
+          </a:p>
+        </p:txBody>
+      </p:sp>
       <p:pic>
         <p:nvPicPr>
-          <p:cNvPr id="15" name="Picture 14">
+          <p:cNvPr id="40" name="Picture 39">
             <a:extLst>
               <a:ext uri="{FF2B5EF4-FFF2-40B4-BE49-F238E27FC236}">
-                <a16:creationId xmlns:a16="http://schemas.microsoft.com/office/drawing/2014/main" id="{C554CDC7-44CF-4751-9869-0265C8E01840}"/>
+                <a16:creationId xmlns:a16="http://schemas.microsoft.com/office/drawing/2014/main" id="{2CB5084C-5462-24D1-A474-CC6332514D02}"/>
               </a:ext>
             </a:extLst>
           </p:cNvPr>
@@ -3173,7 +3275,7 @@
           <p:nvPr userDrawn="1"/>
         </p:nvPicPr>
         <p:blipFill>
-          <a:blip r:embed="rId9" cstate="print">
+          <a:blip r:embed="rId3" cstate="print">
             <a:extLst>
               <a:ext uri="{28A0092B-C50C-407E-A947-70E740481C1C}">
                 <a14:useLocalDpi xmlns:a14="http://schemas.microsoft.com/office/drawing/2010/main" val="0"/>
@@ -3186,7 +3288,7 @@
         </p:blipFill>
         <p:spPr>
           <a:xfrm>
-            <a:off x="333211" y="3189686"/>
+            <a:off x="418659" y="158509"/>
             <a:ext cx="2109916" cy="905256"/>
           </a:xfrm>
           <a:prstGeom prst="rect">
@@ -3194,254 +3296,455 @@
           </a:prstGeom>
         </p:spPr>
       </p:pic>
-      <p:sp>
-        <p:nvSpPr>
-          <p:cNvPr id="6" name="Text Placeholder 5">
+      <p:grpSp>
+        <p:nvGrpSpPr>
+          <p:cNvPr id="41" name="Group 40">
             <a:extLst>
               <a:ext uri="{FF2B5EF4-FFF2-40B4-BE49-F238E27FC236}">
-                <a16:creationId xmlns:a16="http://schemas.microsoft.com/office/drawing/2014/main" id="{516372F2-F09E-4139-B638-4F1B290B77B9}"/>
+                <a16:creationId xmlns:a16="http://schemas.microsoft.com/office/drawing/2014/main" id="{C0B8B302-24C1-F675-B8F5-06EC132B8BED}"/>
               </a:ext>
             </a:extLst>
           </p:cNvPr>
-          <p:cNvSpPr>
-            <a:spLocks noGrp="1"/>
-          </p:cNvSpPr>
-          <p:nvPr>
-            <p:ph type="body" sz="quarter" idx="10" hasCustomPrompt="1"/>
-          </p:nvPr>
-        </p:nvSpPr>
-        <p:spPr>
+          <p:cNvGrpSpPr/>
+          <p:nvPr userDrawn="1"/>
+        </p:nvGrpSpPr>
+        <p:grpSpPr>
           <a:xfrm>
-            <a:off x="9335896" y="5913283"/>
-            <a:ext cx="2852929" cy="262814"/>
+            <a:off x="366259" y="3655396"/>
+            <a:ext cx="2214716" cy="356329"/>
+            <a:chOff x="341278" y="3628835"/>
+            <a:chExt cx="2214716" cy="356329"/>
           </a:xfrm>
-        </p:spPr>
-        <p:txBody>
-          <a:bodyPr/>
-          <a:lstStyle>
-            <a:lvl1pPr marL="0" indent="0" algn="r">
-              <a:buNone/>
-              <a:defRPr sz="1200"/>
-            </a:lvl1pPr>
-          </a:lstStyle>
-          <a:p>
-            <a:pPr lvl="0"/>
-            <a:r>
-              <a:rPr lang="en-US" dirty="0"/>
-              <a:t>R&amp;R number (if required)</a:t>
-            </a:r>
-          </a:p>
-        </p:txBody>
-      </p:sp>
-      <p:sp>
-        <p:nvSpPr>
-          <p:cNvPr id="9" name="Text Placeholder 8">
+        </p:grpSpPr>
+        <p:pic>
+          <p:nvPicPr>
+            <p:cNvPr id="42" name="Picture 2">
+              <a:extLst>
+                <a:ext uri="{FF2B5EF4-FFF2-40B4-BE49-F238E27FC236}">
+                  <a16:creationId xmlns:a16="http://schemas.microsoft.com/office/drawing/2014/main" id="{C30B593E-1A19-AF28-4253-3A1CC732DCDA}"/>
+                </a:ext>
+              </a:extLst>
+            </p:cNvPr>
+            <p:cNvPicPr>
+              <a:picLocks noChangeAspect="1" noChangeArrowheads="1"/>
+            </p:cNvPicPr>
+            <p:nvPr userDrawn="1"/>
+          </p:nvPicPr>
+          <p:blipFill>
+            <a:blip r:embed="rId4">
+              <a:extLst>
+                <a:ext uri="{28A0092B-C50C-407E-A947-70E740481C1C}">
+                  <a14:useLocalDpi xmlns:a14="http://schemas.microsoft.com/office/drawing/2010/main" val="0"/>
+                </a:ext>
+              </a:extLst>
+            </a:blip>
+            <a:srcRect/>
+            <a:stretch>
+              <a:fillRect/>
+            </a:stretch>
+          </p:blipFill>
+          <p:spPr bwMode="auto">
+            <a:xfrm>
+              <a:off x="341278" y="3628835"/>
+              <a:ext cx="1005840" cy="356329"/>
+            </a:xfrm>
+            <a:prstGeom prst="rect">
+              <a:avLst/>
+            </a:prstGeom>
+            <a:noFill/>
+            <a:extLst>
+              <a:ext uri="{909E8E84-426E-40DD-AFC4-6F175D3DCCD1}">
+                <a14:hiddenFill xmlns:a14="http://schemas.microsoft.com/office/drawing/2010/main">
+                  <a:solidFill>
+                    <a:srgbClr val="FFFFFF"/>
+                  </a:solidFill>
+                </a14:hiddenFill>
+              </a:ext>
+            </a:extLst>
+          </p:spPr>
+        </p:pic>
+        <p:pic>
+          <p:nvPicPr>
+            <p:cNvPr id="43" name="Picture 4">
+              <a:extLst>
+                <a:ext uri="{FF2B5EF4-FFF2-40B4-BE49-F238E27FC236}">
+                  <a16:creationId xmlns:a16="http://schemas.microsoft.com/office/drawing/2014/main" id="{FB1111FC-6FEB-7AC1-FEFF-CDDBA1AE28B7}"/>
+                </a:ext>
+              </a:extLst>
+            </p:cNvPr>
+            <p:cNvPicPr>
+              <a:picLocks noChangeAspect="1" noChangeArrowheads="1"/>
+            </p:cNvPicPr>
+            <p:nvPr userDrawn="1"/>
+          </p:nvPicPr>
+          <p:blipFill>
+            <a:blip r:embed="rId5" cstate="print">
+              <a:extLst>
+                <a:ext uri="{28A0092B-C50C-407E-A947-70E740481C1C}">
+                  <a14:useLocalDpi xmlns:a14="http://schemas.microsoft.com/office/drawing/2010/main" val="0"/>
+                </a:ext>
+              </a:extLst>
+            </a:blip>
+            <a:srcRect/>
+            <a:stretch>
+              <a:fillRect/>
+            </a:stretch>
+          </p:blipFill>
+          <p:spPr bwMode="auto">
+            <a:xfrm>
+              <a:off x="1550154" y="3690079"/>
+              <a:ext cx="1005840" cy="233840"/>
+            </a:xfrm>
+            <a:prstGeom prst="rect">
+              <a:avLst/>
+            </a:prstGeom>
+            <a:noFill/>
+            <a:extLst>
+              <a:ext uri="{909E8E84-426E-40DD-AFC4-6F175D3DCCD1}">
+                <a14:hiddenFill xmlns:a14="http://schemas.microsoft.com/office/drawing/2010/main">
+                  <a:solidFill>
+                    <a:srgbClr val="FFFFFF"/>
+                  </a:solidFill>
+                </a14:hiddenFill>
+              </a:ext>
+            </a:extLst>
+          </p:spPr>
+        </p:pic>
+      </p:grpSp>
+      <p:pic>
+        <p:nvPicPr>
+          <p:cNvPr id="44" name="Picture 43" descr="A black and white sign with blue text&#10;&#10;Description automatically generated">
             <a:extLst>
               <a:ext uri="{FF2B5EF4-FFF2-40B4-BE49-F238E27FC236}">
-                <a16:creationId xmlns:a16="http://schemas.microsoft.com/office/drawing/2014/main" id="{7A08ED72-5D36-44C1-A3D6-C72E158E1FA6}"/>
+                <a16:creationId xmlns:a16="http://schemas.microsoft.com/office/drawing/2014/main" id="{A32F8B1D-2E6F-3AF3-7DC1-AF5EAC5E1D15}"/>
               </a:ext>
             </a:extLst>
           </p:cNvPr>
-          <p:cNvSpPr>
-            <a:spLocks noGrp="1"/>
-          </p:cNvSpPr>
-          <p:nvPr>
-            <p:ph type="body" sz="quarter" idx="11" hasCustomPrompt="1"/>
-          </p:nvPr>
-        </p:nvSpPr>
+          <p:cNvPicPr>
+            <a:picLocks noChangeAspect="1"/>
+          </p:cNvPicPr>
+          <p:nvPr userDrawn="1"/>
+        </p:nvPicPr>
+        <p:blipFill>
+          <a:blip r:embed="rId6" cstate="print">
+            <a:extLst>
+              <a:ext uri="{28A0092B-C50C-407E-A947-70E740481C1C}">
+                <a14:useLocalDpi xmlns:a14="http://schemas.microsoft.com/office/drawing/2010/main" val="0"/>
+              </a:ext>
+            </a:extLst>
+          </a:blip>
+          <a:stretch>
+            <a:fillRect/>
+          </a:stretch>
+        </p:blipFill>
         <p:spPr>
           <a:xfrm>
-            <a:off x="3176924" y="2085870"/>
-            <a:ext cx="2427268" cy="424732"/>
+            <a:off x="970697" y="4125123"/>
+            <a:ext cx="1005840" cy="324328"/>
           </a:xfrm>
+          <a:prstGeom prst="rect">
+            <a:avLst/>
+          </a:prstGeom>
         </p:spPr>
-        <p:txBody>
-          <a:bodyPr wrap="none">
-            <a:spAutoFit/>
-          </a:bodyPr>
-          <a:lstStyle>
-            <a:lvl1pPr marL="0" indent="0">
-              <a:buNone/>
-              <a:defRPr u="sng"/>
-            </a:lvl1pPr>
-          </a:lstStyle>
-          <a:p>
-            <a:pPr lvl="0"/>
-            <a:r>
-              <a:rPr lang="en-US" dirty="0"/>
-              <a:t>Presenter Name</a:t>
-            </a:r>
-          </a:p>
-        </p:txBody>
-      </p:sp>
-      <p:sp>
-        <p:nvSpPr>
-          <p:cNvPr id="11" name="Text Placeholder 10">
+      </p:pic>
+      <p:sp>
+        <p:nvSpPr>
+          <p:cNvPr id="45" name="TextBox 44">
             <a:extLst>
               <a:ext uri="{FF2B5EF4-FFF2-40B4-BE49-F238E27FC236}">
-                <a16:creationId xmlns:a16="http://schemas.microsoft.com/office/drawing/2014/main" id="{07C2C5E0-3F9A-4B6C-82C6-FEE7176DA8DC}"/>
+                <a16:creationId xmlns:a16="http://schemas.microsoft.com/office/drawing/2014/main" id="{75277E47-CA34-6D36-5BF2-6D9755BDC116}"/>
               </a:ext>
             </a:extLst>
           </p:cNvPr>
-          <p:cNvSpPr>
-            <a:spLocks noGrp="1"/>
-          </p:cNvSpPr>
-          <p:nvPr>
-            <p:ph type="body" sz="quarter" idx="12" hasCustomPrompt="1"/>
-          </p:nvPr>
+          <p:cNvSpPr txBox="1"/>
+          <p:nvPr userDrawn="1"/>
         </p:nvSpPr>
         <p:spPr>
           <a:xfrm>
-            <a:off x="5667411" y="2134517"/>
-            <a:ext cx="1690167" cy="376085"/>
+            <a:off x="901538" y="1776974"/>
+            <a:ext cx="1144159" cy="350865"/>
           </a:xfrm>
+          <a:prstGeom prst="rect">
+            <a:avLst/>
+          </a:prstGeom>
+          <a:noFill/>
         </p:spPr>
         <p:txBody>
-          <a:bodyPr>
+          <a:bodyPr wrap="none" lIns="118872" tIns="91440" rIns="118872" bIns="91440" rtlCol="0" anchor="ctr" anchorCtr="0">
             <a:spAutoFit/>
           </a:bodyPr>
-          <a:lstStyle>
-            <a:lvl1pPr marL="0" indent="0">
-              <a:buNone/>
-              <a:defRPr sz="2000"/>
-            </a:lvl1pPr>
-          </a:lstStyle>
-          <a:p>
-            <a:pPr lvl="0"/>
-            <a:r>
-              <a:rPr lang="en-US" dirty="0"/>
-              <a:t>(pronouns)</a:t>
-            </a:r>
-          </a:p>
-        </p:txBody>
-      </p:sp>
-      <p:sp>
-        <p:nvSpPr>
-          <p:cNvPr id="20" name="Text Placeholder 10">
+          <a:lstStyle/>
+          <a:p>
+            <a:pPr algn="l">
+              <a:lnSpc>
+                <a:spcPct val="90000"/>
+              </a:lnSpc>
+            </a:pPr>
+            <a:r>
+              <a:rPr lang="en-US" sz="1200" i="1" dirty="0"/>
+              <a:t>Presented by</a:t>
+            </a:r>
+          </a:p>
+        </p:txBody>
+      </p:sp>
+      <p:sp>
+        <p:nvSpPr>
+          <p:cNvPr id="46" name="TextBox 45">
             <a:extLst>
               <a:ext uri="{FF2B5EF4-FFF2-40B4-BE49-F238E27FC236}">
-                <a16:creationId xmlns:a16="http://schemas.microsoft.com/office/drawing/2014/main" id="{6EE16D41-009C-4DB1-A6DF-FEBADC8C343B}"/>
+                <a16:creationId xmlns:a16="http://schemas.microsoft.com/office/drawing/2014/main" id="{A1D6AAEC-CC12-F016-18BF-77DDA41B15DB}"/>
               </a:ext>
             </a:extLst>
           </p:cNvPr>
-          <p:cNvSpPr>
-            <a:spLocks noGrp="1"/>
-          </p:cNvSpPr>
-          <p:nvPr>
-            <p:ph type="body" sz="quarter" idx="13" hasCustomPrompt="1"/>
-          </p:nvPr>
+          <p:cNvSpPr txBox="1"/>
+          <p:nvPr userDrawn="1"/>
         </p:nvSpPr>
         <p:spPr>
           <a:xfrm>
-            <a:off x="3176924" y="2459716"/>
-            <a:ext cx="8292315" cy="369332"/>
+            <a:off x="28657" y="2079048"/>
+            <a:ext cx="2889921" cy="932563"/>
           </a:xfrm>
+          <a:prstGeom prst="rect">
+            <a:avLst/>
+          </a:prstGeom>
+          <a:noFill/>
         </p:spPr>
         <p:txBody>
-          <a:bodyPr wrap="square">
+          <a:bodyPr wrap="square" lIns="118872" tIns="91440" rIns="118872" bIns="91440" rtlCol="0" anchor="ctr" anchorCtr="0">
             <a:spAutoFit/>
           </a:bodyPr>
-          <a:lstStyle>
-            <a:lvl1pPr marL="0" indent="0">
-              <a:buNone/>
-              <a:defRPr sz="2000"/>
-            </a:lvl1pPr>
-          </a:lstStyle>
-          <a:p>
-            <a:pPr lvl="0"/>
-            <a:r>
-              <a:rPr lang="en-US" dirty="0"/>
-              <a:t>Long affiliation</a:t>
-            </a:r>
-          </a:p>
-        </p:txBody>
-      </p:sp>
-      <p:sp>
-        <p:nvSpPr>
-          <p:cNvPr id="21" name="Text Placeholder 10">
+          <a:lstStyle/>
+          <a:p>
+            <a:pPr algn="l">
+              <a:lnSpc>
+                <a:spcPct val="90000"/>
+              </a:lnSpc>
+            </a:pPr>
+            <a:r>
+              <a:rPr lang="en-US" b="1" dirty="0"/>
+              <a:t>COLABS: Collaboration for Better Software for Science</a:t>
+            </a:r>
+          </a:p>
+        </p:txBody>
+      </p:sp>
+      <p:sp>
+        <p:nvSpPr>
+          <p:cNvPr id="47" name="TextBox 46">
             <a:extLst>
               <a:ext uri="{FF2B5EF4-FFF2-40B4-BE49-F238E27FC236}">
-                <a16:creationId xmlns:a16="http://schemas.microsoft.com/office/drawing/2014/main" id="{8E791C6E-DB06-44D1-AB4E-AA0EF8215FBB}"/>
+                <a16:creationId xmlns:a16="http://schemas.microsoft.com/office/drawing/2014/main" id="{A9847169-3AB3-F2CA-8A1A-FD3A26490F82}"/>
               </a:ext>
             </a:extLst>
           </p:cNvPr>
-          <p:cNvSpPr>
-            <a:spLocks noGrp="1"/>
-          </p:cNvSpPr>
-          <p:nvPr>
-            <p:ph type="body" sz="quarter" idx="14" hasCustomPrompt="1"/>
-          </p:nvPr>
+          <p:cNvSpPr txBox="1"/>
+          <p:nvPr userDrawn="1"/>
         </p:nvSpPr>
         <p:spPr>
           <a:xfrm>
-            <a:off x="3176925" y="3161813"/>
-            <a:ext cx="8292316" cy="369332"/>
+            <a:off x="676315" y="3191133"/>
+            <a:ext cx="1594604" cy="350865"/>
           </a:xfrm>
+          <a:prstGeom prst="rect">
+            <a:avLst/>
+          </a:prstGeom>
+          <a:noFill/>
         </p:spPr>
         <p:txBody>
-          <a:bodyPr wrap="square">
+          <a:bodyPr wrap="none" lIns="118872" tIns="91440" rIns="118872" bIns="91440" rtlCol="0" anchor="ctr" anchorCtr="0">
             <a:spAutoFit/>
           </a:bodyPr>
-          <a:lstStyle>
-            <a:lvl1pPr marL="0" indent="0">
-              <a:buNone/>
-              <a:defRPr sz="2000"/>
-            </a:lvl1pPr>
-          </a:lstStyle>
-          <a:p>
-            <a:pPr lvl="0"/>
-            <a:r>
-              <a:rPr lang="en-US" dirty="0"/>
-              <a:t>Tutorial title @ Venue</a:t>
-            </a:r>
-          </a:p>
-        </p:txBody>
-      </p:sp>
-      <p:sp>
-        <p:nvSpPr>
-          <p:cNvPr id="23" name="Text Placeholder 10">
+          <a:lstStyle/>
+          <a:p>
+            <a:pPr algn="l">
+              <a:lnSpc>
+                <a:spcPct val="90000"/>
+              </a:lnSpc>
+            </a:pPr>
+            <a:r>
+              <a:rPr lang="en-US" sz="1200" i="1" dirty="0"/>
+              <a:t>In collaboration with</a:t>
+            </a:r>
+          </a:p>
+        </p:txBody>
+      </p:sp>
+      <p:sp>
+        <p:nvSpPr>
+          <p:cNvPr id="48" name="TextBox 47">
             <a:extLst>
               <a:ext uri="{FF2B5EF4-FFF2-40B4-BE49-F238E27FC236}">
-                <a16:creationId xmlns:a16="http://schemas.microsoft.com/office/drawing/2014/main" id="{AA4CD3CE-55B5-4132-9AC3-B94506768C36}"/>
+                <a16:creationId xmlns:a16="http://schemas.microsoft.com/office/drawing/2014/main" id="{845B1F43-84F7-723B-2A4D-22020EB6343C}"/>
               </a:ext>
             </a:extLst>
           </p:cNvPr>
-          <p:cNvSpPr>
-            <a:spLocks noGrp="1"/>
-          </p:cNvSpPr>
-          <p:nvPr>
-            <p:ph type="body" sz="quarter" idx="15" hasCustomPrompt="1"/>
-          </p:nvPr>
+          <p:cNvSpPr txBox="1"/>
+          <p:nvPr userDrawn="1"/>
         </p:nvSpPr>
         <p:spPr>
           <a:xfrm>
-            <a:off x="3176924" y="3792588"/>
-            <a:ext cx="8292316" cy="646331"/>
+            <a:off x="572120" y="4562849"/>
+            <a:ext cx="1802994" cy="350865"/>
           </a:xfrm>
+          <a:prstGeom prst="rect">
+            <a:avLst/>
+          </a:prstGeom>
+          <a:noFill/>
         </p:spPr>
         <p:txBody>
-          <a:bodyPr wrap="square">
+          <a:bodyPr wrap="none" lIns="118872" tIns="91440" rIns="118872" bIns="91440" rtlCol="0" anchor="ctr" anchorCtr="0">
             <a:spAutoFit/>
           </a:bodyPr>
-          <a:lstStyle>
-            <a:lvl1pPr marL="0" indent="0">
-              <a:buNone/>
-              <a:defRPr sz="2000"/>
-            </a:lvl1pPr>
-          </a:lstStyle>
-          <a:p>
-            <a:pPr>
-              <a:spcBef>
-                <a:spcPts val="2800"/>
-              </a:spcBef>
-            </a:pPr>
-            <a:r>
-              <a:rPr lang="en-US" sz="2000" dirty="0"/>
-              <a:t>Contributors: Contributor Name (short affiliation), … in alphabetical order</a:t>
-            </a:r>
-          </a:p>
-        </p:txBody>
-      </p:sp>
+          <a:lstStyle/>
+          <a:p>
+            <a:pPr algn="l">
+              <a:lnSpc>
+                <a:spcPct val="90000"/>
+              </a:lnSpc>
+            </a:pPr>
+            <a:r>
+              <a:rPr lang="en-US" sz="1200" i="1" dirty="0"/>
+              <a:t>With prior support from</a:t>
+            </a:r>
+          </a:p>
+        </p:txBody>
+      </p:sp>
+      <p:grpSp>
+        <p:nvGrpSpPr>
+          <p:cNvPr id="49" name="Group 48">
+            <a:extLst>
+              <a:ext uri="{FF2B5EF4-FFF2-40B4-BE49-F238E27FC236}">
+                <a16:creationId xmlns:a16="http://schemas.microsoft.com/office/drawing/2014/main" id="{396131DF-6FCE-D706-44F2-0DBA2A523AD5}"/>
+              </a:ext>
+            </a:extLst>
+          </p:cNvPr>
+          <p:cNvGrpSpPr/>
+          <p:nvPr userDrawn="1"/>
+        </p:nvGrpSpPr>
+        <p:grpSpPr>
+          <a:xfrm>
+            <a:off x="355043" y="5027111"/>
+            <a:ext cx="2237149" cy="457200"/>
+            <a:chOff x="343050" y="5128711"/>
+            <a:chExt cx="2237149" cy="457200"/>
+          </a:xfrm>
+        </p:grpSpPr>
+        <p:pic>
+          <p:nvPicPr>
+            <p:cNvPr id="50" name="Picture 49">
+              <a:extLst>
+                <a:ext uri="{FF2B5EF4-FFF2-40B4-BE49-F238E27FC236}">
+                  <a16:creationId xmlns:a16="http://schemas.microsoft.com/office/drawing/2014/main" id="{79D514FB-85E5-055B-44A5-B55A58F7B260}"/>
+                </a:ext>
+              </a:extLst>
+            </p:cNvPr>
+            <p:cNvPicPr>
+              <a:picLocks noChangeAspect="1"/>
+            </p:cNvPicPr>
+            <p:nvPr userDrawn="1"/>
+          </p:nvPicPr>
+          <p:blipFill>
+            <a:blip r:embed="rId7" cstate="print">
+              <a:extLst>
+                <a:ext uri="{28A0092B-C50C-407E-A947-70E740481C1C}">
+                  <a14:useLocalDpi xmlns:a14="http://schemas.microsoft.com/office/drawing/2010/main" val="0"/>
+                </a:ext>
+              </a:extLst>
+            </a:blip>
+            <a:stretch>
+              <a:fillRect/>
+            </a:stretch>
+          </p:blipFill>
+          <p:spPr>
+            <a:xfrm>
+              <a:off x="343050" y="5128711"/>
+              <a:ext cx="1002296" cy="457200"/>
+            </a:xfrm>
+            <a:prstGeom prst="rect">
+              <a:avLst/>
+            </a:prstGeom>
+          </p:spPr>
+        </p:pic>
+        <p:pic>
+          <p:nvPicPr>
+            <p:cNvPr id="51" name="Picture 50" descr="A picture containing shape&#10;&#10;Description automatically generated">
+              <a:extLst>
+                <a:ext uri="{FF2B5EF4-FFF2-40B4-BE49-F238E27FC236}">
+                  <a16:creationId xmlns:a16="http://schemas.microsoft.com/office/drawing/2014/main" id="{7C799E3D-E384-96A7-734D-1196AF8B4EB0}"/>
+                </a:ext>
+              </a:extLst>
+            </p:cNvPr>
+            <p:cNvPicPr>
+              <a:picLocks noChangeAspect="1"/>
+            </p:cNvPicPr>
+            <p:nvPr userDrawn="1"/>
+          </p:nvPicPr>
+          <p:blipFill>
+            <a:blip r:embed="rId8">
+              <a:extLst>
+                <a:ext uri="{28A0092B-C50C-407E-A947-70E740481C1C}">
+                  <a14:useLocalDpi xmlns:a14="http://schemas.microsoft.com/office/drawing/2010/main" val="0"/>
+                </a:ext>
+              </a:extLst>
+            </a:blip>
+            <a:stretch>
+              <a:fillRect/>
+            </a:stretch>
+          </p:blipFill>
+          <p:spPr>
+            <a:xfrm>
+              <a:off x="1525950" y="5128711"/>
+              <a:ext cx="1054249" cy="457200"/>
+            </a:xfrm>
+            <a:prstGeom prst="rect">
+              <a:avLst/>
+            </a:prstGeom>
+          </p:spPr>
+        </p:pic>
+      </p:grpSp>
+      <p:pic>
+        <p:nvPicPr>
+          <p:cNvPr id="52" name="Picture 51">
+            <a:extLst>
+              <a:ext uri="{FF2B5EF4-FFF2-40B4-BE49-F238E27FC236}">
+                <a16:creationId xmlns:a16="http://schemas.microsoft.com/office/drawing/2014/main" id="{26757728-4E77-48A1-9D91-E9C18913D0BF}"/>
+              </a:ext>
+            </a:extLst>
+          </p:cNvPr>
+          <p:cNvPicPr>
+            <a:picLocks noChangeAspect="1"/>
+          </p:cNvPicPr>
+          <p:nvPr userDrawn="1"/>
+        </p:nvPicPr>
+        <p:blipFill>
+          <a:blip r:embed="rId9" cstate="print">
+            <a:extLst>
+              <a:ext uri="{BEBA8EAE-BF5A-486C-A8C5-ECC9F3942E4B}">
+                <a14:imgProps xmlns:a14="http://schemas.microsoft.com/office/drawing/2010/main">
+                  <a14:imgLayer r:embed="rId10">
+                    <a14:imgEffect>
+                      <a14:brightnessContrast bright="100000"/>
+                    </a14:imgEffect>
+                  </a14:imgLayer>
+                </a14:imgProps>
+              </a:ext>
+              <a:ext uri="{28A0092B-C50C-407E-A947-70E740481C1C}">
+                <a14:useLocalDpi xmlns:a14="http://schemas.microsoft.com/office/drawing/2010/main" val="0"/>
+              </a:ext>
+            </a:extLst>
+          </a:blip>
+          <a:stretch>
+            <a:fillRect/>
+          </a:stretch>
+        </p:blipFill>
+        <p:spPr>
+          <a:xfrm>
+            <a:off x="9536165" y="6321694"/>
+            <a:ext cx="2409477" cy="401008"/>
+          </a:xfrm>
+          <a:prstGeom prst="rect">
+            <a:avLst/>
+          </a:prstGeom>
+        </p:spPr>
+      </p:pic>
     </p:spTree>
     <p:extLst>
       <p:ext uri="{BB962C8B-B14F-4D97-AF65-F5344CB8AC3E}">
@@ -3539,17 +3842,14 @@
                 <a:spcPct val="90000"/>
               </a:lnSpc>
             </a:pPr>
-            <a:r>
-              <a:rPr lang="en-US" sz="1600" dirty="0">
-                <a:ln>
-                  <a:noFill/>
-                </a:ln>
-                <a:solidFill>
-                  <a:schemeClr val="bg1"/>
-                </a:solidFill>
-              </a:rPr>
-              <a:t>exascaleproject.org</a:t>
-            </a:r>
+            <a:endParaRPr lang="en-US" sz="1600" dirty="0">
+              <a:ln>
+                <a:noFill/>
+              </a:ln>
+              <a:solidFill>
+                <a:schemeClr val="bg1"/>
+              </a:solidFill>
+            </a:endParaRPr>
           </a:p>
         </p:txBody>
       </p:sp>
@@ -3776,149 +4076,6 @@
       </p:sp>
       <p:pic>
         <p:nvPicPr>
-          <p:cNvPr id="12" name="Picture 11"/>
-          <p:cNvPicPr>
-            <a:picLocks noChangeAspect="1"/>
-          </p:cNvPicPr>
-          <p:nvPr userDrawn="1"/>
-        </p:nvPicPr>
-        <p:blipFill>
-          <a:blip r:embed="rId2" cstate="print">
-            <a:extLst>
-              <a:ext uri="{28A0092B-C50C-407E-A947-70E740481C1C}">
-                <a14:useLocalDpi xmlns:a14="http://schemas.microsoft.com/office/drawing/2010/main" val="0"/>
-              </a:ext>
-            </a:extLst>
-          </a:blip>
-          <a:stretch>
-            <a:fillRect/>
-          </a:stretch>
-        </p:blipFill>
-        <p:spPr>
-          <a:xfrm>
-            <a:off x="362749" y="483164"/>
-            <a:ext cx="2050840" cy="935496"/>
-          </a:xfrm>
-          <a:prstGeom prst="rect">
-            <a:avLst/>
-          </a:prstGeom>
-        </p:spPr>
-      </p:pic>
-      <p:pic>
-        <p:nvPicPr>
-          <p:cNvPr id="16" name="Picture 15"/>
-          <p:cNvPicPr>
-            <a:picLocks noChangeAspect="1"/>
-          </p:cNvPicPr>
-          <p:nvPr userDrawn="1"/>
-        </p:nvPicPr>
-        <p:blipFill>
-          <a:blip r:embed="rId3" cstate="print">
-            <a:extLst>
-              <a:ext uri="{BEBA8EAE-BF5A-486C-A8C5-ECC9F3942E4B}">
-                <a14:imgProps xmlns:a14="http://schemas.microsoft.com/office/drawing/2010/main">
-                  <a14:imgLayer r:embed="rId4">
-                    <a14:imgEffect>
-                      <a14:brightnessContrast bright="100000"/>
-                    </a14:imgEffect>
-                  </a14:imgLayer>
-                </a14:imgProps>
-              </a:ext>
-              <a:ext uri="{28A0092B-C50C-407E-A947-70E740481C1C}">
-                <a14:useLocalDpi xmlns:a14="http://schemas.microsoft.com/office/drawing/2010/main" val="0"/>
-              </a:ext>
-            </a:extLst>
-          </a:blip>
-          <a:stretch>
-            <a:fillRect/>
-          </a:stretch>
-        </p:blipFill>
-        <p:spPr>
-          <a:xfrm>
-            <a:off x="7289921" y="6322747"/>
-            <a:ext cx="2409477" cy="401008"/>
-          </a:xfrm>
-          <a:prstGeom prst="rect">
-            <a:avLst/>
-          </a:prstGeom>
-        </p:spPr>
-      </p:pic>
-      <p:pic>
-        <p:nvPicPr>
-          <p:cNvPr id="17" name="Picture 16"/>
-          <p:cNvPicPr>
-            <a:picLocks noChangeAspect="1"/>
-          </p:cNvPicPr>
-          <p:nvPr userDrawn="1"/>
-        </p:nvPicPr>
-        <p:blipFill rotWithShape="1">
-          <a:blip r:embed="rId5" cstate="print">
-            <a:extLst>
-              <a:ext uri="{BEBA8EAE-BF5A-486C-A8C5-ECC9F3942E4B}">
-                <a14:imgProps xmlns:a14="http://schemas.microsoft.com/office/drawing/2010/main">
-                  <a14:imgLayer r:embed="rId6">
-                    <a14:imgEffect>
-                      <a14:brightnessContrast bright="100000"/>
-                    </a14:imgEffect>
-                  </a14:imgLayer>
-                </a14:imgProps>
-              </a:ext>
-              <a:ext uri="{28A0092B-C50C-407E-A947-70E740481C1C}">
-                <a14:useLocalDpi xmlns:a14="http://schemas.microsoft.com/office/drawing/2010/main" val="0"/>
-              </a:ext>
-            </a:extLst>
-          </a:blip>
-          <a:srcRect b="70693"/>
-          <a:stretch/>
-        </p:blipFill>
-        <p:spPr>
-          <a:xfrm>
-            <a:off x="10204521" y="6307740"/>
-            <a:ext cx="1367541" cy="428915"/>
-          </a:xfrm>
-          <a:prstGeom prst="rect">
-            <a:avLst/>
-          </a:prstGeom>
-        </p:spPr>
-      </p:pic>
-      <p:pic>
-        <p:nvPicPr>
-          <p:cNvPr id="8" name="Picture 7" descr="A picture containing shape&#10;&#10;Description automatically generated">
-            <a:extLst>
-              <a:ext uri="{FF2B5EF4-FFF2-40B4-BE49-F238E27FC236}">
-                <a16:creationId xmlns:a16="http://schemas.microsoft.com/office/drawing/2014/main" id="{C432A180-7341-4E28-8C2B-73F9AB53D13F}"/>
-              </a:ext>
-            </a:extLst>
-          </p:cNvPr>
-          <p:cNvPicPr>
-            <a:picLocks noChangeAspect="1"/>
-          </p:cNvPicPr>
-          <p:nvPr userDrawn="1"/>
-        </p:nvPicPr>
-        <p:blipFill>
-          <a:blip r:embed="rId7">
-            <a:extLst>
-              <a:ext uri="{28A0092B-C50C-407E-A947-70E740481C1C}">
-                <a14:useLocalDpi xmlns:a14="http://schemas.microsoft.com/office/drawing/2010/main" val="0"/>
-              </a:ext>
-            </a:extLst>
-          </a:blip>
-          <a:stretch>
-            <a:fillRect/>
-          </a:stretch>
-        </p:blipFill>
-        <p:spPr>
-          <a:xfrm>
-            <a:off x="333920" y="1848659"/>
-            <a:ext cx="2108499" cy="914400"/>
-          </a:xfrm>
-          <a:prstGeom prst="rect">
-            <a:avLst/>
-          </a:prstGeom>
-        </p:spPr>
-      </p:pic>
-      <p:pic>
-        <p:nvPicPr>
           <p:cNvPr id="13" name="Picture 2" descr="https://licensebuttons.net/l/by/4.0/88x31.png">
             <a:extLst>
               <a:ext uri="{FF2B5EF4-FFF2-40B4-BE49-F238E27FC236}">
@@ -3932,7 +4089,7 @@
           <p:nvPr userDrawn="1"/>
         </p:nvPicPr>
         <p:blipFill>
-          <a:blip r:embed="rId8">
+          <a:blip r:embed="rId2">
             <a:extLst>
               <a:ext uri="{28A0092B-C50C-407E-A947-70E740481C1C}">
                 <a14:useLocalDpi xmlns:a14="http://schemas.microsoft.com/office/drawing/2010/main" val="0"/>
@@ -4006,10 +4163,10 @@
       </p:sp>
       <p:pic>
         <p:nvPicPr>
-          <p:cNvPr id="15" name="Picture 14">
+          <p:cNvPr id="5" name="Picture 4">
             <a:extLst>
               <a:ext uri="{FF2B5EF4-FFF2-40B4-BE49-F238E27FC236}">
-                <a16:creationId xmlns:a16="http://schemas.microsoft.com/office/drawing/2014/main" id="{C554CDC7-44CF-4751-9869-0265C8E01840}"/>
+                <a16:creationId xmlns:a16="http://schemas.microsoft.com/office/drawing/2014/main" id="{2D43BC9F-555E-0052-7164-935F842258EC}"/>
               </a:ext>
             </a:extLst>
           </p:cNvPr>
@@ -4019,7 +4176,7 @@
           <p:nvPr userDrawn="1"/>
         </p:nvPicPr>
         <p:blipFill>
-          <a:blip r:embed="rId9" cstate="print">
+          <a:blip r:embed="rId3" cstate="print">
             <a:extLst>
               <a:ext uri="{28A0092B-C50C-407E-A947-70E740481C1C}">
                 <a14:useLocalDpi xmlns:a14="http://schemas.microsoft.com/office/drawing/2010/main" val="0"/>
@@ -4032,8 +4189,457 @@
         </p:blipFill>
         <p:spPr>
           <a:xfrm>
-            <a:off x="333211" y="3189686"/>
+            <a:off x="418659" y="158509"/>
             <a:ext cx="2109916" cy="905256"/>
+          </a:xfrm>
+          <a:prstGeom prst="rect">
+            <a:avLst/>
+          </a:prstGeom>
+        </p:spPr>
+      </p:pic>
+      <p:grpSp>
+        <p:nvGrpSpPr>
+          <p:cNvPr id="6" name="Group 5">
+            <a:extLst>
+              <a:ext uri="{FF2B5EF4-FFF2-40B4-BE49-F238E27FC236}">
+                <a16:creationId xmlns:a16="http://schemas.microsoft.com/office/drawing/2014/main" id="{1097D61F-362D-7955-EB1E-31BFE2384484}"/>
+              </a:ext>
+            </a:extLst>
+          </p:cNvPr>
+          <p:cNvGrpSpPr/>
+          <p:nvPr userDrawn="1"/>
+        </p:nvGrpSpPr>
+        <p:grpSpPr>
+          <a:xfrm>
+            <a:off x="366259" y="3655396"/>
+            <a:ext cx="2214716" cy="356329"/>
+            <a:chOff x="341278" y="3628835"/>
+            <a:chExt cx="2214716" cy="356329"/>
+          </a:xfrm>
+        </p:grpSpPr>
+        <p:pic>
+          <p:nvPicPr>
+            <p:cNvPr id="7" name="Picture 2">
+              <a:extLst>
+                <a:ext uri="{FF2B5EF4-FFF2-40B4-BE49-F238E27FC236}">
+                  <a16:creationId xmlns:a16="http://schemas.microsoft.com/office/drawing/2014/main" id="{6A64BFE4-17B1-F15F-E1DE-D006CF61D38E}"/>
+                </a:ext>
+              </a:extLst>
+            </p:cNvPr>
+            <p:cNvPicPr>
+              <a:picLocks noChangeAspect="1" noChangeArrowheads="1"/>
+            </p:cNvPicPr>
+            <p:nvPr userDrawn="1"/>
+          </p:nvPicPr>
+          <p:blipFill>
+            <a:blip r:embed="rId4">
+              <a:extLst>
+                <a:ext uri="{28A0092B-C50C-407E-A947-70E740481C1C}">
+                  <a14:useLocalDpi xmlns:a14="http://schemas.microsoft.com/office/drawing/2010/main" val="0"/>
+                </a:ext>
+              </a:extLst>
+            </a:blip>
+            <a:srcRect/>
+            <a:stretch>
+              <a:fillRect/>
+            </a:stretch>
+          </p:blipFill>
+          <p:spPr bwMode="auto">
+            <a:xfrm>
+              <a:off x="341278" y="3628835"/>
+              <a:ext cx="1005840" cy="356329"/>
+            </a:xfrm>
+            <a:prstGeom prst="rect">
+              <a:avLst/>
+            </a:prstGeom>
+            <a:noFill/>
+            <a:extLst>
+              <a:ext uri="{909E8E84-426E-40DD-AFC4-6F175D3DCCD1}">
+                <a14:hiddenFill xmlns:a14="http://schemas.microsoft.com/office/drawing/2010/main">
+                  <a:solidFill>
+                    <a:srgbClr val="FFFFFF"/>
+                  </a:solidFill>
+                </a14:hiddenFill>
+              </a:ext>
+            </a:extLst>
+          </p:spPr>
+        </p:pic>
+        <p:pic>
+          <p:nvPicPr>
+            <p:cNvPr id="9" name="Picture 4">
+              <a:extLst>
+                <a:ext uri="{FF2B5EF4-FFF2-40B4-BE49-F238E27FC236}">
+                  <a16:creationId xmlns:a16="http://schemas.microsoft.com/office/drawing/2014/main" id="{2236DD1E-B87E-621B-E9A5-6864A07A7AAE}"/>
+                </a:ext>
+              </a:extLst>
+            </p:cNvPr>
+            <p:cNvPicPr>
+              <a:picLocks noChangeAspect="1" noChangeArrowheads="1"/>
+            </p:cNvPicPr>
+            <p:nvPr userDrawn="1"/>
+          </p:nvPicPr>
+          <p:blipFill>
+            <a:blip r:embed="rId5" cstate="print">
+              <a:extLst>
+                <a:ext uri="{28A0092B-C50C-407E-A947-70E740481C1C}">
+                  <a14:useLocalDpi xmlns:a14="http://schemas.microsoft.com/office/drawing/2010/main" val="0"/>
+                </a:ext>
+              </a:extLst>
+            </a:blip>
+            <a:srcRect/>
+            <a:stretch>
+              <a:fillRect/>
+            </a:stretch>
+          </p:blipFill>
+          <p:spPr bwMode="auto">
+            <a:xfrm>
+              <a:off x="1550154" y="3690079"/>
+              <a:ext cx="1005840" cy="233840"/>
+            </a:xfrm>
+            <a:prstGeom prst="rect">
+              <a:avLst/>
+            </a:prstGeom>
+            <a:noFill/>
+            <a:extLst>
+              <a:ext uri="{909E8E84-426E-40DD-AFC4-6F175D3DCCD1}">
+                <a14:hiddenFill xmlns:a14="http://schemas.microsoft.com/office/drawing/2010/main">
+                  <a:solidFill>
+                    <a:srgbClr val="FFFFFF"/>
+                  </a:solidFill>
+                </a14:hiddenFill>
+              </a:ext>
+            </a:extLst>
+          </p:spPr>
+        </p:pic>
+      </p:grpSp>
+      <p:pic>
+        <p:nvPicPr>
+          <p:cNvPr id="10" name="Picture 9" descr="A black and white sign with blue text&#10;&#10;Description automatically generated">
+            <a:extLst>
+              <a:ext uri="{FF2B5EF4-FFF2-40B4-BE49-F238E27FC236}">
+                <a16:creationId xmlns:a16="http://schemas.microsoft.com/office/drawing/2014/main" id="{EB5EFF08-B290-0CCF-CC4C-2653B417D175}"/>
+              </a:ext>
+            </a:extLst>
+          </p:cNvPr>
+          <p:cNvPicPr>
+            <a:picLocks noChangeAspect="1"/>
+          </p:cNvPicPr>
+          <p:nvPr userDrawn="1"/>
+        </p:nvPicPr>
+        <p:blipFill>
+          <a:blip r:embed="rId6" cstate="print">
+            <a:extLst>
+              <a:ext uri="{28A0092B-C50C-407E-A947-70E740481C1C}">
+                <a14:useLocalDpi xmlns:a14="http://schemas.microsoft.com/office/drawing/2010/main" val="0"/>
+              </a:ext>
+            </a:extLst>
+          </a:blip>
+          <a:stretch>
+            <a:fillRect/>
+          </a:stretch>
+        </p:blipFill>
+        <p:spPr>
+          <a:xfrm>
+            <a:off x="970697" y="4125123"/>
+            <a:ext cx="1005840" cy="324328"/>
+          </a:xfrm>
+          <a:prstGeom prst="rect">
+            <a:avLst/>
+          </a:prstGeom>
+        </p:spPr>
+      </p:pic>
+      <p:sp>
+        <p:nvSpPr>
+          <p:cNvPr id="11" name="TextBox 10">
+            <a:extLst>
+              <a:ext uri="{FF2B5EF4-FFF2-40B4-BE49-F238E27FC236}">
+                <a16:creationId xmlns:a16="http://schemas.microsoft.com/office/drawing/2014/main" id="{FC413B1D-9BF0-0AB9-6D50-407461C1CA90}"/>
+              </a:ext>
+            </a:extLst>
+          </p:cNvPr>
+          <p:cNvSpPr txBox="1"/>
+          <p:nvPr userDrawn="1"/>
+        </p:nvSpPr>
+        <p:spPr>
+          <a:xfrm>
+            <a:off x="901538" y="1776974"/>
+            <a:ext cx="1144159" cy="350865"/>
+          </a:xfrm>
+          <a:prstGeom prst="rect">
+            <a:avLst/>
+          </a:prstGeom>
+          <a:noFill/>
+        </p:spPr>
+        <p:txBody>
+          <a:bodyPr wrap="none" lIns="118872" tIns="91440" rIns="118872" bIns="91440" rtlCol="0" anchor="ctr" anchorCtr="0">
+            <a:spAutoFit/>
+          </a:bodyPr>
+          <a:lstStyle/>
+          <a:p>
+            <a:pPr algn="l">
+              <a:lnSpc>
+                <a:spcPct val="90000"/>
+              </a:lnSpc>
+            </a:pPr>
+            <a:r>
+              <a:rPr lang="en-US" sz="1200" i="1" dirty="0"/>
+              <a:t>Presented by</a:t>
+            </a:r>
+          </a:p>
+        </p:txBody>
+      </p:sp>
+      <p:sp>
+        <p:nvSpPr>
+          <p:cNvPr id="18" name="TextBox 17">
+            <a:extLst>
+              <a:ext uri="{FF2B5EF4-FFF2-40B4-BE49-F238E27FC236}">
+                <a16:creationId xmlns:a16="http://schemas.microsoft.com/office/drawing/2014/main" id="{A7C28369-4DCF-F695-A5FB-03F89EB293A8}"/>
+              </a:ext>
+            </a:extLst>
+          </p:cNvPr>
+          <p:cNvSpPr txBox="1"/>
+          <p:nvPr userDrawn="1"/>
+        </p:nvSpPr>
+        <p:spPr>
+          <a:xfrm>
+            <a:off x="28657" y="2079048"/>
+            <a:ext cx="2889921" cy="932563"/>
+          </a:xfrm>
+          <a:prstGeom prst="rect">
+            <a:avLst/>
+          </a:prstGeom>
+          <a:noFill/>
+        </p:spPr>
+        <p:txBody>
+          <a:bodyPr wrap="square" lIns="118872" tIns="91440" rIns="118872" bIns="91440" rtlCol="0" anchor="ctr" anchorCtr="0">
+            <a:spAutoFit/>
+          </a:bodyPr>
+          <a:lstStyle/>
+          <a:p>
+            <a:pPr algn="l">
+              <a:lnSpc>
+                <a:spcPct val="90000"/>
+              </a:lnSpc>
+            </a:pPr>
+            <a:r>
+              <a:rPr lang="en-US" b="1" dirty="0"/>
+              <a:t>COLABS: Collaboration for Better Software for Science</a:t>
+            </a:r>
+          </a:p>
+        </p:txBody>
+      </p:sp>
+      <p:sp>
+        <p:nvSpPr>
+          <p:cNvPr id="19" name="TextBox 18">
+            <a:extLst>
+              <a:ext uri="{FF2B5EF4-FFF2-40B4-BE49-F238E27FC236}">
+                <a16:creationId xmlns:a16="http://schemas.microsoft.com/office/drawing/2014/main" id="{D51C8A7B-0316-39AE-775A-55736562435D}"/>
+              </a:ext>
+            </a:extLst>
+          </p:cNvPr>
+          <p:cNvSpPr txBox="1"/>
+          <p:nvPr userDrawn="1"/>
+        </p:nvSpPr>
+        <p:spPr>
+          <a:xfrm>
+            <a:off x="676315" y="3191133"/>
+            <a:ext cx="1594604" cy="350865"/>
+          </a:xfrm>
+          <a:prstGeom prst="rect">
+            <a:avLst/>
+          </a:prstGeom>
+          <a:noFill/>
+        </p:spPr>
+        <p:txBody>
+          <a:bodyPr wrap="none" lIns="118872" tIns="91440" rIns="118872" bIns="91440" rtlCol="0" anchor="ctr" anchorCtr="0">
+            <a:spAutoFit/>
+          </a:bodyPr>
+          <a:lstStyle/>
+          <a:p>
+            <a:pPr algn="l">
+              <a:lnSpc>
+                <a:spcPct val="90000"/>
+              </a:lnSpc>
+            </a:pPr>
+            <a:r>
+              <a:rPr lang="en-US" sz="1200" i="1" dirty="0"/>
+              <a:t>In collaboration with</a:t>
+            </a:r>
+          </a:p>
+        </p:txBody>
+      </p:sp>
+      <p:sp>
+        <p:nvSpPr>
+          <p:cNvPr id="20" name="TextBox 19">
+            <a:extLst>
+              <a:ext uri="{FF2B5EF4-FFF2-40B4-BE49-F238E27FC236}">
+                <a16:creationId xmlns:a16="http://schemas.microsoft.com/office/drawing/2014/main" id="{BEAED3BC-7EE5-26B1-A660-AEAC75B333A5}"/>
+              </a:ext>
+            </a:extLst>
+          </p:cNvPr>
+          <p:cNvSpPr txBox="1"/>
+          <p:nvPr userDrawn="1"/>
+        </p:nvSpPr>
+        <p:spPr>
+          <a:xfrm>
+            <a:off x="572120" y="4562849"/>
+            <a:ext cx="1802994" cy="350865"/>
+          </a:xfrm>
+          <a:prstGeom prst="rect">
+            <a:avLst/>
+          </a:prstGeom>
+          <a:noFill/>
+        </p:spPr>
+        <p:txBody>
+          <a:bodyPr wrap="none" lIns="118872" tIns="91440" rIns="118872" bIns="91440" rtlCol="0" anchor="ctr" anchorCtr="0">
+            <a:spAutoFit/>
+          </a:bodyPr>
+          <a:lstStyle/>
+          <a:p>
+            <a:pPr algn="l">
+              <a:lnSpc>
+                <a:spcPct val="90000"/>
+              </a:lnSpc>
+            </a:pPr>
+            <a:r>
+              <a:rPr lang="en-US" sz="1200" i="1" dirty="0"/>
+              <a:t>With prior support from</a:t>
+            </a:r>
+          </a:p>
+        </p:txBody>
+      </p:sp>
+      <p:grpSp>
+        <p:nvGrpSpPr>
+          <p:cNvPr id="21" name="Group 20">
+            <a:extLst>
+              <a:ext uri="{FF2B5EF4-FFF2-40B4-BE49-F238E27FC236}">
+                <a16:creationId xmlns:a16="http://schemas.microsoft.com/office/drawing/2014/main" id="{2488A492-D53A-BCE5-6A54-0A361AACBC5D}"/>
+              </a:ext>
+            </a:extLst>
+          </p:cNvPr>
+          <p:cNvGrpSpPr/>
+          <p:nvPr userDrawn="1"/>
+        </p:nvGrpSpPr>
+        <p:grpSpPr>
+          <a:xfrm>
+            <a:off x="355043" y="5027111"/>
+            <a:ext cx="2237149" cy="457200"/>
+            <a:chOff x="343050" y="5128711"/>
+            <a:chExt cx="2237149" cy="457200"/>
+          </a:xfrm>
+        </p:grpSpPr>
+        <p:pic>
+          <p:nvPicPr>
+            <p:cNvPr id="23" name="Picture 22">
+              <a:extLst>
+                <a:ext uri="{FF2B5EF4-FFF2-40B4-BE49-F238E27FC236}">
+                  <a16:creationId xmlns:a16="http://schemas.microsoft.com/office/drawing/2014/main" id="{6D66EA9B-85AC-62A8-81AF-BD36E0079D09}"/>
+                </a:ext>
+              </a:extLst>
+            </p:cNvPr>
+            <p:cNvPicPr>
+              <a:picLocks noChangeAspect="1"/>
+            </p:cNvPicPr>
+            <p:nvPr userDrawn="1"/>
+          </p:nvPicPr>
+          <p:blipFill>
+            <a:blip r:embed="rId7" cstate="print">
+              <a:extLst>
+                <a:ext uri="{28A0092B-C50C-407E-A947-70E740481C1C}">
+                  <a14:useLocalDpi xmlns:a14="http://schemas.microsoft.com/office/drawing/2010/main" val="0"/>
+                </a:ext>
+              </a:extLst>
+            </a:blip>
+            <a:stretch>
+              <a:fillRect/>
+            </a:stretch>
+          </p:blipFill>
+          <p:spPr>
+            <a:xfrm>
+              <a:off x="343050" y="5128711"/>
+              <a:ext cx="1002296" cy="457200"/>
+            </a:xfrm>
+            <a:prstGeom prst="rect">
+              <a:avLst/>
+            </a:prstGeom>
+          </p:spPr>
+        </p:pic>
+        <p:pic>
+          <p:nvPicPr>
+            <p:cNvPr id="24" name="Picture 23" descr="A picture containing shape&#10;&#10;Description automatically generated">
+              <a:extLst>
+                <a:ext uri="{FF2B5EF4-FFF2-40B4-BE49-F238E27FC236}">
+                  <a16:creationId xmlns:a16="http://schemas.microsoft.com/office/drawing/2014/main" id="{11D2235B-A87E-AAE5-8043-56870F82DCE9}"/>
+                </a:ext>
+              </a:extLst>
+            </p:cNvPr>
+            <p:cNvPicPr>
+              <a:picLocks noChangeAspect="1"/>
+            </p:cNvPicPr>
+            <p:nvPr userDrawn="1"/>
+          </p:nvPicPr>
+          <p:blipFill>
+            <a:blip r:embed="rId8">
+              <a:extLst>
+                <a:ext uri="{28A0092B-C50C-407E-A947-70E740481C1C}">
+                  <a14:useLocalDpi xmlns:a14="http://schemas.microsoft.com/office/drawing/2010/main" val="0"/>
+                </a:ext>
+              </a:extLst>
+            </a:blip>
+            <a:stretch>
+              <a:fillRect/>
+            </a:stretch>
+          </p:blipFill>
+          <p:spPr>
+            <a:xfrm>
+              <a:off x="1525950" y="5128711"/>
+              <a:ext cx="1054249" cy="457200"/>
+            </a:xfrm>
+            <a:prstGeom prst="rect">
+              <a:avLst/>
+            </a:prstGeom>
+          </p:spPr>
+        </p:pic>
+      </p:grpSp>
+      <p:pic>
+        <p:nvPicPr>
+          <p:cNvPr id="25" name="Picture 24">
+            <a:extLst>
+              <a:ext uri="{FF2B5EF4-FFF2-40B4-BE49-F238E27FC236}">
+                <a16:creationId xmlns:a16="http://schemas.microsoft.com/office/drawing/2014/main" id="{C69FC97A-7B20-0258-B9B3-47F9963A44F5}"/>
+              </a:ext>
+            </a:extLst>
+          </p:cNvPr>
+          <p:cNvPicPr>
+            <a:picLocks noChangeAspect="1"/>
+          </p:cNvPicPr>
+          <p:nvPr userDrawn="1"/>
+        </p:nvPicPr>
+        <p:blipFill>
+          <a:blip r:embed="rId9" cstate="print">
+            <a:extLst>
+              <a:ext uri="{BEBA8EAE-BF5A-486C-A8C5-ECC9F3942E4B}">
+                <a14:imgProps xmlns:a14="http://schemas.microsoft.com/office/drawing/2010/main">
+                  <a14:imgLayer r:embed="rId10">
+                    <a14:imgEffect>
+                      <a14:brightnessContrast bright="100000"/>
+                    </a14:imgEffect>
+                  </a14:imgLayer>
+                </a14:imgProps>
+              </a:ext>
+              <a:ext uri="{28A0092B-C50C-407E-A947-70E740481C1C}">
+                <a14:useLocalDpi xmlns:a14="http://schemas.microsoft.com/office/drawing/2010/main" val="0"/>
+              </a:ext>
+            </a:extLst>
+          </a:blip>
+          <a:stretch>
+            <a:fillRect/>
+          </a:stretch>
+        </p:blipFill>
+        <p:spPr>
+          <a:xfrm>
+            <a:off x="9536165" y="6321694"/>
+            <a:ext cx="2409477" cy="401008"/>
           </a:xfrm>
           <a:prstGeom prst="rect">
             <a:avLst/>
@@ -5699,36 +6305,6 @@
           </a:p>
         </p:txBody>
       </p:sp>
-      <p:pic>
-        <p:nvPicPr>
-          <p:cNvPr id="13" name="Picture 12"/>
-          <p:cNvPicPr>
-            <a:picLocks noChangeAspect="1"/>
-          </p:cNvPicPr>
-          <p:nvPr userDrawn="1"/>
-        </p:nvPicPr>
-        <p:blipFill>
-          <a:blip r:embed="rId9" cstate="print">
-            <a:extLst>
-              <a:ext uri="{28A0092B-C50C-407E-A947-70E740481C1C}">
-                <a14:useLocalDpi xmlns:a14="http://schemas.microsoft.com/office/drawing/2010/main" val="0"/>
-              </a:ext>
-            </a:extLst>
-          </a:blip>
-          <a:stretch>
-            <a:fillRect/>
-          </a:stretch>
-        </p:blipFill>
-        <p:spPr>
-          <a:xfrm>
-            <a:off x="9741160" y="6185919"/>
-            <a:ext cx="1971212" cy="533060"/>
-          </a:xfrm>
-          <a:prstGeom prst="rect">
-            <a:avLst/>
-          </a:prstGeom>
-        </p:spPr>
-      </p:pic>
       <p:sp>
         <p:nvSpPr>
           <p:cNvPr id="8" name="Rectangle 256"/>
@@ -5832,42 +6408,6 @@
           </a:p>
         </p:txBody>
       </p:sp>
-      <p:pic>
-        <p:nvPicPr>
-          <p:cNvPr id="3" name="Picture 2" descr="A picture containing shape&#10;&#10;Description automatically generated">
-            <a:extLst>
-              <a:ext uri="{FF2B5EF4-FFF2-40B4-BE49-F238E27FC236}">
-                <a16:creationId xmlns:a16="http://schemas.microsoft.com/office/drawing/2014/main" id="{2A4943B8-0F89-4A94-B130-A128F45E57C4}"/>
-              </a:ext>
-            </a:extLst>
-          </p:cNvPr>
-          <p:cNvPicPr>
-            <a:picLocks noChangeAspect="1"/>
-          </p:cNvPicPr>
-          <p:nvPr userDrawn="1"/>
-        </p:nvPicPr>
-        <p:blipFill>
-          <a:blip r:embed="rId10">
-            <a:extLst>
-              <a:ext uri="{28A0092B-C50C-407E-A947-70E740481C1C}">
-                <a14:useLocalDpi xmlns:a14="http://schemas.microsoft.com/office/drawing/2010/main" val="0"/>
-              </a:ext>
-            </a:extLst>
-          </a:blip>
-          <a:stretch>
-            <a:fillRect/>
-          </a:stretch>
-        </p:blipFill>
-        <p:spPr>
-          <a:xfrm>
-            <a:off x="7806050" y="6114121"/>
-            <a:ext cx="1560289" cy="676656"/>
-          </a:xfrm>
-          <a:prstGeom prst="rect">
-            <a:avLst/>
-          </a:prstGeom>
-        </p:spPr>
-      </p:pic>
     </p:spTree>
     <p:extLst>
       <p:ext uri="{BB962C8B-B14F-4D97-AF65-F5344CB8AC3E}">
@@ -9832,36 +10372,26 @@
               <a:t>The requested citation the overall tutorial is: </a:t>
             </a:r>
             <a:r>
-              <a:rPr lang="en-US" sz="1600" b="0" i="0" dirty="0">
-                <a:solidFill>
-                  <a:srgbClr val="111111"/>
-                </a:solidFill>
-                <a:effectLst/>
-                <a:latin typeface="+mn-lt"/>
-              </a:rPr>
-              <a:t>Anshu Dubey, David E. Bernholdt, Greg Becker, and Jared O’Neal, Software Productivity and Sustainability track, in Argonne Training Program on Extreme-Scale Computing, St. Charles, Illinois, 2024. DOI: </a:t>
-            </a:r>
-            <a:r>
-              <a:rPr lang="en-US" sz="1600" b="0" i="0" u="none" strike="noStrike" dirty="0">
-                <a:solidFill>
-                  <a:srgbClr val="2A7AE2"/>
-                </a:solidFill>
-                <a:effectLst/>
-                <a:latin typeface="+mn-lt"/>
+              <a:rPr lang="en-US" sz="1600" dirty="0"/>
+              <a:t>Anshu Dubey, David E. Bernholdt, Todd Gamblin, and Jared O’Neal, Software Productivity and Sustainability track, in Argonne Training Program on Extreme-Scale Computing, St. Charles, Illinois, 2024. DOI: </a:t>
+            </a:r>
+            <a:r>
+              <a:rPr lang="en-US" sz="1600" dirty="0">
                 <a:hlinkClick r:id="rId4"/>
               </a:rPr>
-              <a:t>10.6084/m9.figshare.23823822</a:t>
-            </a:r>
-            <a:r>
-              <a:rPr lang="en-US" sz="1600" b="0" i="0" dirty="0">
-                <a:solidFill>
-                  <a:srgbClr val="111111"/>
-                </a:solidFill>
-                <a:effectLst/>
-                <a:latin typeface="+mn-lt"/>
-              </a:rPr>
+              <a:t>10.6084/m9.figshare.26384188</a:t>
+            </a:r>
+            <a:r>
+              <a:rPr lang="en-US" sz="1600" dirty="0"/>
               <a:t>.</a:t>
             </a:r>
+            <a:endParaRPr lang="en-US" sz="1600" b="0" i="0" dirty="0">
+              <a:solidFill>
+                <a:srgbClr val="111111"/>
+              </a:solidFill>
+              <a:effectLst/>
+              <a:latin typeface="+mn-lt"/>
+            </a:endParaRPr>
           </a:p>
           <a:p>
             <a:pPr>
@@ -9922,7 +10452,20 @@
               <a:rPr lang="en-US" sz="1400" i="1" dirty="0"/>
               <a:t>.</a:t>
             </a:r>
-            <a:endParaRPr lang="en-US" sz="1400" dirty="0"/>
+          </a:p>
+          <a:p>
+            <a:pPr>
+              <a:spcBef>
+                <a:spcPts val="400"/>
+              </a:spcBef>
+            </a:pPr>
+            <a:r>
+              <a:rPr lang="en-US" sz="1400" b="0" i="0" dirty="0">
+                <a:effectLst/>
+                <a:latin typeface="+mn-lt"/>
+              </a:rPr>
+              <a:t>This work was supported by the U.S. Department of Energy, Office of Science, Office of Advanced Scientific Computing Research, Next-Generation Scientific Software Technologies (NGSST) program.</a:t>
+            </a:r>
           </a:p>
           <a:p>
             <a:pPr>
@@ -10031,7 +10574,7 @@
     </p:spTree>
     <p:extLst>
       <p:ext uri="{BB962C8B-B14F-4D97-AF65-F5344CB8AC3E}">
-        <p14:creationId xmlns:p14="http://schemas.microsoft.com/office/powerpoint/2010/main" val="3472888141"/>
+        <p14:creationId xmlns:p14="http://schemas.microsoft.com/office/powerpoint/2010/main" val="978726433"/>
       </p:ext>
     </p:extLst>
   </p:cSld>
@@ -15261,6 +15804,15 @@
 </file>
 
 <file path=customXml/item1.xml><?xml version="1.0" encoding="utf-8"?>
+<?mso-contentType ?>
+<FormTemplates xmlns="http://schemas.microsoft.com/sharepoint/v3/contenttype/forms">
+  <Display>DocumentLibraryForm</Display>
+  <Edit>DocumentLibraryForm</Edit>
+  <New>DocumentLibraryForm</New>
+</FormTemplates>
+</file>
+
+<file path=customXml/item2.xml><?xml version="1.0" encoding="utf-8"?>
 <ct:contentTypeSchema xmlns:ct="http://schemas.microsoft.com/office/2006/metadata/contentType" xmlns:ma="http://schemas.microsoft.com/office/2006/metadata/properties/metaAttributes" ct:_="" ma:_="" ma:contentTypeName="Document" ma:contentTypeID="0x010100565464437F680748A68B85EB6594EA7D" ma:contentTypeVersion="0" ma:contentTypeDescription="Create a new document." ma:contentTypeScope="" ma:versionID="fe3f4dd58d5914c51cfc6deaa8ad845c">
   <xsd:schema xmlns:xsd="http://www.w3.org/2001/XMLSchema" xmlns:p="http://schemas.microsoft.com/office/2006/metadata/properties" targetNamespace="http://schemas.microsoft.com/office/2006/metadata/properties" ma:root="true" ma:fieldsID="4aeb20c0e3442673af7ee10786458764">
     <xsd:element name="properties">
@@ -15309,15 +15861,6 @@
 </ct:contentTypeSchema>
 </file>
 
-<file path=customXml/item2.xml><?xml version="1.0" encoding="utf-8"?>
-<?mso-contentType ?>
-<FormTemplates xmlns="http://schemas.microsoft.com/sharepoint/v3/contenttype/forms">
-  <Display>DocumentLibraryForm</Display>
-  <Edit>DocumentLibraryForm</Edit>
-  <New>DocumentLibraryForm</New>
-</FormTemplates>
-</file>
-
 <file path=customXml/item3.xml><?xml version="1.0" encoding="utf-8"?>
 <p:properties xmlns:p="http://schemas.microsoft.com/office/2006/metadata/properties" xmlns:xsi="http://www.w3.org/2001/XMLSchema-instance" xmlns:pc="http://schemas.microsoft.com/office/infopath/2007/PartnerControls">
   <documentManagement/>
@@ -15325,6 +15868,14 @@
 </file>
 
 <file path=customXml/itemProps1.xml><?xml version="1.0" encoding="utf-8"?>
+<ds:datastoreItem xmlns:ds="http://schemas.openxmlformats.org/officeDocument/2006/customXml" ds:itemID="{19E20559-B232-4371-8690-E3D8007EDB82}">
+  <ds:schemaRefs>
+    <ds:schemaRef ds:uri="http://schemas.microsoft.com/sharepoint/v3/contenttype/forms"/>
+  </ds:schemaRefs>
+</ds:datastoreItem>
+</file>
+
+<file path=customXml/itemProps2.xml><?xml version="1.0" encoding="utf-8"?>
 <ds:datastoreItem xmlns:ds="http://schemas.openxmlformats.org/officeDocument/2006/customXml" ds:itemID="{E8DB7DEB-074E-4EE8-9B6E-FD277323109C}">
   <ds:schemaRefs>
     <ds:schemaRef ds:uri="http://schemas.microsoft.com/office/2006/metadata/contentType"/>
@@ -15335,14 +15886,6 @@
     <ds:schemaRef ds:uri="http://purl.org/dc/elements/1.1/"/>
     <ds:schemaRef ds:uri="http://purl.org/dc/terms/"/>
     <ds:schemaRef ds:uri="http://schemas.microsoft.com/office/internal/2005/internalDocumentation"/>
-  </ds:schemaRefs>
-</ds:datastoreItem>
-</file>
-
-<file path=customXml/itemProps2.xml><?xml version="1.0" encoding="utf-8"?>
-<ds:datastoreItem xmlns:ds="http://schemas.openxmlformats.org/officeDocument/2006/customXml" ds:itemID="{19E20559-B232-4371-8690-E3D8007EDB82}">
-  <ds:schemaRefs>
-    <ds:schemaRef ds:uri="http://schemas.microsoft.com/sharepoint/v3/contenttype/forms"/>
   </ds:schemaRefs>
 </ds:datastoreItem>
 </file>

</xml_diff>